<commit_message>
Updates night logo w/ Sports Pilot
</commit_message>
<xml_diff>
--- a/docs/Tiles.pptx
+++ b/docs/Tiles.pptx
@@ -262,7 +262,7 @@
           <a:p>
             <a:fld id="{46DA5C4A-B072-FB48-84F0-865EE8F0D843}" type="datetimeFigureOut">
               <a:rPr lang="en-US" smtClean="0"/>
-              <a:t>9/28/2025</a:t>
+              <a:t>10/9/25</a:t>
             </a:fld>
             <a:endParaRPr lang="en-US"/>
           </a:p>
@@ -460,7 +460,7 @@
           <a:p>
             <a:fld id="{46DA5C4A-B072-FB48-84F0-865EE8F0D843}" type="datetimeFigureOut">
               <a:rPr lang="en-US" smtClean="0"/>
-              <a:t>9/28/2025</a:t>
+              <a:t>10/9/25</a:t>
             </a:fld>
             <a:endParaRPr lang="en-US"/>
           </a:p>
@@ -668,7 +668,7 @@
           <a:p>
             <a:fld id="{46DA5C4A-B072-FB48-84F0-865EE8F0D843}" type="datetimeFigureOut">
               <a:rPr lang="en-US" smtClean="0"/>
-              <a:t>9/28/2025</a:t>
+              <a:t>10/9/25</a:t>
             </a:fld>
             <a:endParaRPr lang="en-US"/>
           </a:p>
@@ -866,7 +866,7 @@
           <a:p>
             <a:fld id="{46DA5C4A-B072-FB48-84F0-865EE8F0D843}" type="datetimeFigureOut">
               <a:rPr lang="en-US" smtClean="0"/>
-              <a:t>9/28/2025</a:t>
+              <a:t>10/9/25</a:t>
             </a:fld>
             <a:endParaRPr lang="en-US"/>
           </a:p>
@@ -1141,7 +1141,7 @@
           <a:p>
             <a:fld id="{46DA5C4A-B072-FB48-84F0-865EE8F0D843}" type="datetimeFigureOut">
               <a:rPr lang="en-US" smtClean="0"/>
-              <a:t>9/28/2025</a:t>
+              <a:t>10/9/25</a:t>
             </a:fld>
             <a:endParaRPr lang="en-US"/>
           </a:p>
@@ -1406,7 +1406,7 @@
           <a:p>
             <a:fld id="{46DA5C4A-B072-FB48-84F0-865EE8F0D843}" type="datetimeFigureOut">
               <a:rPr lang="en-US" smtClean="0"/>
-              <a:t>9/28/2025</a:t>
+              <a:t>10/9/25</a:t>
             </a:fld>
             <a:endParaRPr lang="en-US"/>
           </a:p>
@@ -1818,7 +1818,7 @@
           <a:p>
             <a:fld id="{46DA5C4A-B072-FB48-84F0-865EE8F0D843}" type="datetimeFigureOut">
               <a:rPr lang="en-US" smtClean="0"/>
-              <a:t>9/28/2025</a:t>
+              <a:t>10/9/25</a:t>
             </a:fld>
             <a:endParaRPr lang="en-US"/>
           </a:p>
@@ -1959,7 +1959,7 @@
           <a:p>
             <a:fld id="{46DA5C4A-B072-FB48-84F0-865EE8F0D843}" type="datetimeFigureOut">
               <a:rPr lang="en-US" smtClean="0"/>
-              <a:t>9/28/2025</a:t>
+              <a:t>10/9/25</a:t>
             </a:fld>
             <a:endParaRPr lang="en-US"/>
           </a:p>
@@ -2072,7 +2072,7 @@
           <a:p>
             <a:fld id="{46DA5C4A-B072-FB48-84F0-865EE8F0D843}" type="datetimeFigureOut">
               <a:rPr lang="en-US" smtClean="0"/>
-              <a:t>9/28/2025</a:t>
+              <a:t>10/9/25</a:t>
             </a:fld>
             <a:endParaRPr lang="en-US"/>
           </a:p>
@@ -2383,7 +2383,7 @@
           <a:p>
             <a:fld id="{46DA5C4A-B072-FB48-84F0-865EE8F0D843}" type="datetimeFigureOut">
               <a:rPr lang="en-US" smtClean="0"/>
-              <a:t>9/28/2025</a:t>
+              <a:t>10/9/25</a:t>
             </a:fld>
             <a:endParaRPr lang="en-US"/>
           </a:p>
@@ -2671,7 +2671,7 @@
           <a:p>
             <a:fld id="{46DA5C4A-B072-FB48-84F0-865EE8F0D843}" type="datetimeFigureOut">
               <a:rPr lang="en-US" smtClean="0"/>
-              <a:t>9/28/2025</a:t>
+              <a:t>10/9/25</a:t>
             </a:fld>
             <a:endParaRPr lang="en-US"/>
           </a:p>
@@ -2912,7 +2912,7 @@
           <a:p>
             <a:fld id="{46DA5C4A-B072-FB48-84F0-865EE8F0D843}" type="datetimeFigureOut">
               <a:rPr lang="en-US" smtClean="0"/>
-              <a:t>9/28/2025</a:t>
+              <a:t>10/9/25</a:t>
             </a:fld>
             <a:endParaRPr lang="en-US"/>
           </a:p>
@@ -5776,7 +5776,7 @@
           </a:fontRef>
         </p:style>
         <p:txBody>
-          <a:bodyPr rtlCol="0" anchor="ctr"/>
+          <a:bodyPr tIns="1828800" bIns="91440" rtlCol="0" anchor="ctr"/>
           <a:lstStyle/>
           <a:p>
             <a:pPr algn="ctr"/>
@@ -5798,8 +5798,8 @@
         </p:nvSpPr>
         <p:spPr>
           <a:xfrm>
-            <a:off x="4267200" y="1645920"/>
-            <a:ext cx="3657600" cy="3657600"/>
+            <a:off x="4315968" y="1645920"/>
+            <a:ext cx="3566160" cy="3657600"/>
           </a:xfrm>
           <a:prstGeom prst="rect">
             <a:avLst/>
@@ -5807,7 +5807,7 @@
           <a:noFill/>
         </p:spPr>
         <p:txBody>
-          <a:bodyPr wrap="square" rtlCol="0">
+          <a:bodyPr wrap="square" lIns="914400" tIns="914400" rIns="914400" bIns="914400" rtlCol="0" anchor="t" anchorCtr="0">
             <a:prstTxWarp prst="textArchUp">
               <a:avLst>
                 <a:gd name="adj" fmla="val 6940555"/>
@@ -5824,7 +5824,7 @@
                   <a:schemeClr val="bg1"/>
                 </a:solidFill>
               </a:rPr>
-              <a:t>Log Night Flight Time</a:t>
+              <a:t>Log Night – Sport Pilot Night</a:t>
             </a:r>
           </a:p>
         </p:txBody>

</xml_diff>

<commit_message>
New visual for oxygen requirements
</commit_message>
<xml_diff>
--- a/docs/Tiles.pptx
+++ b/docs/Tiles.pptx
@@ -7,8 +7,9 @@
   <p:sldIdLst>
     <p:sldId id="256" r:id="rId2"/>
     <p:sldId id="257" r:id="rId3"/>
-    <p:sldId id="258" r:id="rId4"/>
-    <p:sldId id="259" r:id="rId5"/>
+    <p:sldId id="260" r:id="rId4"/>
+    <p:sldId id="258" r:id="rId5"/>
+    <p:sldId id="259" r:id="rId6"/>
   </p:sldIdLst>
   <p:sldSz cx="12192000" cy="6858000"/>
   <p:notesSz cx="6858000" cy="9144000"/>
@@ -273,7 +274,7 @@
           <a:p>
             <a:fld id="{46DA5C4A-B072-FB48-84F0-865EE8F0D843}" type="datetimeFigureOut">
               <a:rPr lang="en-US" smtClean="0"/>
-              <a:t>10/12/2025</a:t>
+              <a:t>10/22/25</a:t>
             </a:fld>
             <a:endParaRPr lang="en-US"/>
           </a:p>
@@ -471,7 +472,7 @@
           <a:p>
             <a:fld id="{46DA5C4A-B072-FB48-84F0-865EE8F0D843}" type="datetimeFigureOut">
               <a:rPr lang="en-US" smtClean="0"/>
-              <a:t>10/12/2025</a:t>
+              <a:t>10/22/25</a:t>
             </a:fld>
             <a:endParaRPr lang="en-US"/>
           </a:p>
@@ -679,7 +680,7 @@
           <a:p>
             <a:fld id="{46DA5C4A-B072-FB48-84F0-865EE8F0D843}" type="datetimeFigureOut">
               <a:rPr lang="en-US" smtClean="0"/>
-              <a:t>10/12/2025</a:t>
+              <a:t>10/22/25</a:t>
             </a:fld>
             <a:endParaRPr lang="en-US"/>
           </a:p>
@@ -877,7 +878,7 @@
           <a:p>
             <a:fld id="{46DA5C4A-B072-FB48-84F0-865EE8F0D843}" type="datetimeFigureOut">
               <a:rPr lang="en-US" smtClean="0"/>
-              <a:t>10/12/2025</a:t>
+              <a:t>10/22/25</a:t>
             </a:fld>
             <a:endParaRPr lang="en-US"/>
           </a:p>
@@ -1152,7 +1153,7 @@
           <a:p>
             <a:fld id="{46DA5C4A-B072-FB48-84F0-865EE8F0D843}" type="datetimeFigureOut">
               <a:rPr lang="en-US" smtClean="0"/>
-              <a:t>10/12/2025</a:t>
+              <a:t>10/22/25</a:t>
             </a:fld>
             <a:endParaRPr lang="en-US"/>
           </a:p>
@@ -1417,7 +1418,7 @@
           <a:p>
             <a:fld id="{46DA5C4A-B072-FB48-84F0-865EE8F0D843}" type="datetimeFigureOut">
               <a:rPr lang="en-US" smtClean="0"/>
-              <a:t>10/12/2025</a:t>
+              <a:t>10/22/25</a:t>
             </a:fld>
             <a:endParaRPr lang="en-US"/>
           </a:p>
@@ -1829,7 +1830,7 @@
           <a:p>
             <a:fld id="{46DA5C4A-B072-FB48-84F0-865EE8F0D843}" type="datetimeFigureOut">
               <a:rPr lang="en-US" smtClean="0"/>
-              <a:t>10/12/2025</a:t>
+              <a:t>10/22/25</a:t>
             </a:fld>
             <a:endParaRPr lang="en-US"/>
           </a:p>
@@ -1970,7 +1971,7 @@
           <a:p>
             <a:fld id="{46DA5C4A-B072-FB48-84F0-865EE8F0D843}" type="datetimeFigureOut">
               <a:rPr lang="en-US" smtClean="0"/>
-              <a:t>10/12/2025</a:t>
+              <a:t>10/22/25</a:t>
             </a:fld>
             <a:endParaRPr lang="en-US"/>
           </a:p>
@@ -2083,7 +2084,7 @@
           <a:p>
             <a:fld id="{46DA5C4A-B072-FB48-84F0-865EE8F0D843}" type="datetimeFigureOut">
               <a:rPr lang="en-US" smtClean="0"/>
-              <a:t>10/12/2025</a:t>
+              <a:t>10/22/25</a:t>
             </a:fld>
             <a:endParaRPr lang="en-US"/>
           </a:p>
@@ -2394,7 +2395,7 @@
           <a:p>
             <a:fld id="{46DA5C4A-B072-FB48-84F0-865EE8F0D843}" type="datetimeFigureOut">
               <a:rPr lang="en-US" smtClean="0"/>
-              <a:t>10/12/2025</a:t>
+              <a:t>10/22/25</a:t>
             </a:fld>
             <a:endParaRPr lang="en-US"/>
           </a:p>
@@ -2682,7 +2683,7 @@
           <a:p>
             <a:fld id="{46DA5C4A-B072-FB48-84F0-865EE8F0D843}" type="datetimeFigureOut">
               <a:rPr lang="en-US" smtClean="0"/>
-              <a:t>10/12/2025</a:t>
+              <a:t>10/22/25</a:t>
             </a:fld>
             <a:endParaRPr lang="en-US"/>
           </a:p>
@@ -2923,7 +2924,7 @@
           <a:p>
             <a:fld id="{46DA5C4A-B072-FB48-84F0-865EE8F0D843}" type="datetimeFigureOut">
               <a:rPr lang="en-US" smtClean="0"/>
-              <a:t>10/12/2025</a:t>
+              <a:t>10/22/25</a:t>
             </a:fld>
             <a:endParaRPr lang="en-US"/>
           </a:p>
@@ -4920,6 +4921,1164 @@
   <p:cSld>
     <p:spTree>
       <p:nvGrpSpPr>
+        <p:cNvPr id="1" name="">
+          <a:extLst>
+            <a:ext uri="{FF2B5EF4-FFF2-40B4-BE49-F238E27FC236}">
+              <a16:creationId xmlns:a16="http://schemas.microsoft.com/office/drawing/2014/main" id="{695509B2-51B9-E62B-58EC-24994E544169}"/>
+            </a:ext>
+          </a:extLst>
+        </p:cNvPr>
+        <p:cNvGrpSpPr/>
+        <p:nvPr/>
+      </p:nvGrpSpPr>
+      <p:grpSpPr>
+        <a:xfrm>
+          <a:off x="0" y="0"/>
+          <a:ext cx="0" cy="0"/>
+          <a:chOff x="0" y="0"/>
+          <a:chExt cx="0" cy="0"/>
+        </a:xfrm>
+      </p:grpSpPr>
+      <p:sp>
+        <p:nvSpPr>
+          <p:cNvPr id="2" name="Rectangle 1">
+            <a:extLst>
+              <a:ext uri="{FF2B5EF4-FFF2-40B4-BE49-F238E27FC236}">
+                <a16:creationId xmlns:a16="http://schemas.microsoft.com/office/drawing/2014/main" id="{1C78F419-4E68-FCC4-AB48-A20933D3269F}"/>
+              </a:ext>
+            </a:extLst>
+          </p:cNvPr>
+          <p:cNvSpPr/>
+          <p:nvPr/>
+        </p:nvSpPr>
+        <p:spPr>
+          <a:xfrm>
+            <a:off x="3561907" y="1541721"/>
+            <a:ext cx="4380614" cy="4380614"/>
+          </a:xfrm>
+          <a:prstGeom prst="rect">
+            <a:avLst/>
+          </a:prstGeom>
+          <a:noFill/>
+        </p:spPr>
+        <p:style>
+          <a:lnRef idx="2">
+            <a:schemeClr val="accent1">
+              <a:shade val="15000"/>
+            </a:schemeClr>
+          </a:lnRef>
+          <a:fillRef idx="1">
+            <a:schemeClr val="accent1"/>
+          </a:fillRef>
+          <a:effectRef idx="0">
+            <a:schemeClr val="accent1"/>
+          </a:effectRef>
+          <a:fontRef idx="minor">
+            <a:schemeClr val="lt1"/>
+          </a:fontRef>
+        </p:style>
+        <p:txBody>
+          <a:bodyPr rtlCol="0" anchor="ctr"/>
+          <a:lstStyle/>
+          <a:p>
+            <a:pPr algn="ctr"/>
+            <a:endParaRPr lang="en-US"/>
+          </a:p>
+        </p:txBody>
+      </p:sp>
+      <p:sp>
+        <p:nvSpPr>
+          <p:cNvPr id="3" name="TextBox 2">
+            <a:extLst>
+              <a:ext uri="{FF2B5EF4-FFF2-40B4-BE49-F238E27FC236}">
+                <a16:creationId xmlns:a16="http://schemas.microsoft.com/office/drawing/2014/main" id="{4490E80B-FCDD-5AEC-CD01-EBAC1F462594}"/>
+              </a:ext>
+            </a:extLst>
+          </p:cNvPr>
+          <p:cNvSpPr txBox="1"/>
+          <p:nvPr/>
+        </p:nvSpPr>
+        <p:spPr>
+          <a:xfrm>
+            <a:off x="4306981" y="1574905"/>
+            <a:ext cx="1759439" cy="400110"/>
+          </a:xfrm>
+          <a:prstGeom prst="rect">
+            <a:avLst/>
+          </a:prstGeom>
+          <a:noFill/>
+        </p:spPr>
+        <p:txBody>
+          <a:bodyPr wrap="square" rtlCol="0">
+            <a:spAutoFit/>
+          </a:bodyPr>
+          <a:lstStyle/>
+          <a:p>
+            <a:pPr algn="ctr"/>
+            <a:r>
+              <a:rPr lang="en-US" sz="2000" dirty="0"/>
+              <a:t>Crew</a:t>
+            </a:r>
+          </a:p>
+        </p:txBody>
+      </p:sp>
+      <p:cxnSp>
+        <p:nvCxnSpPr>
+          <p:cNvPr id="4" name="Straight Connector 3">
+            <a:extLst>
+              <a:ext uri="{FF2B5EF4-FFF2-40B4-BE49-F238E27FC236}">
+                <a16:creationId xmlns:a16="http://schemas.microsoft.com/office/drawing/2014/main" id="{50D47D45-C1F4-2222-E4D3-BE56EB0BE841}"/>
+              </a:ext>
+            </a:extLst>
+          </p:cNvPr>
+          <p:cNvCxnSpPr>
+            <a:cxnSpLocks/>
+          </p:cNvCxnSpPr>
+          <p:nvPr/>
+        </p:nvCxnSpPr>
+        <p:spPr>
+          <a:xfrm>
+            <a:off x="3561907" y="2007900"/>
+            <a:ext cx="4380614" cy="0"/>
+          </a:xfrm>
+          <a:prstGeom prst="line">
+            <a:avLst/>
+          </a:prstGeom>
+          <a:ln>
+            <a:solidFill>
+              <a:schemeClr val="bg1">
+                <a:lumMod val="75000"/>
+              </a:schemeClr>
+            </a:solidFill>
+          </a:ln>
+        </p:spPr>
+        <p:style>
+          <a:lnRef idx="2">
+            <a:schemeClr val="accent1"/>
+          </a:lnRef>
+          <a:fillRef idx="0">
+            <a:schemeClr val="accent1"/>
+          </a:fillRef>
+          <a:effectRef idx="1">
+            <a:schemeClr val="accent1"/>
+          </a:effectRef>
+          <a:fontRef idx="minor">
+            <a:schemeClr val="tx1"/>
+          </a:fontRef>
+        </p:style>
+      </p:cxnSp>
+      <p:sp>
+        <p:nvSpPr>
+          <p:cNvPr id="11" name="TextBox 10">
+            <a:extLst>
+              <a:ext uri="{FF2B5EF4-FFF2-40B4-BE49-F238E27FC236}">
+                <a16:creationId xmlns:a16="http://schemas.microsoft.com/office/drawing/2014/main" id="{C3CCCF43-7299-08CA-21E3-ADBD5E353F97}"/>
+              </a:ext>
+            </a:extLst>
+          </p:cNvPr>
+          <p:cNvSpPr txBox="1"/>
+          <p:nvPr/>
+        </p:nvSpPr>
+        <p:spPr>
+          <a:xfrm>
+            <a:off x="3595775" y="2594911"/>
+            <a:ext cx="729455" cy="338554"/>
+          </a:xfrm>
+          <a:prstGeom prst="rect">
+            <a:avLst/>
+          </a:prstGeom>
+          <a:noFill/>
+        </p:spPr>
+        <p:txBody>
+          <a:bodyPr wrap="square" rtlCol="0">
+            <a:spAutoFit/>
+          </a:bodyPr>
+          <a:lstStyle/>
+          <a:p>
+            <a:pPr algn="r"/>
+            <a:r>
+              <a:rPr lang="en-US" sz="1600" b="1" dirty="0"/>
+              <a:t>25</a:t>
+            </a:r>
+            <a:r>
+              <a:rPr lang="en-US" sz="1200" dirty="0"/>
+              <a:t>,</a:t>
+            </a:r>
+            <a:r>
+              <a:rPr lang="en-US" sz="1050" dirty="0"/>
+              <a:t>000</a:t>
+            </a:r>
+            <a:endParaRPr lang="en-US" sz="1200" dirty="0"/>
+          </a:p>
+        </p:txBody>
+      </p:sp>
+      <p:sp>
+        <p:nvSpPr>
+          <p:cNvPr id="9" name="TextBox 8">
+            <a:extLst>
+              <a:ext uri="{FF2B5EF4-FFF2-40B4-BE49-F238E27FC236}">
+                <a16:creationId xmlns:a16="http://schemas.microsoft.com/office/drawing/2014/main" id="{62957A32-59F8-2AF7-411A-90833F0F95B6}"/>
+              </a:ext>
+            </a:extLst>
+          </p:cNvPr>
+          <p:cNvSpPr txBox="1"/>
+          <p:nvPr/>
+        </p:nvSpPr>
+        <p:spPr>
+          <a:xfrm>
+            <a:off x="6103340" y="1573468"/>
+            <a:ext cx="1759439" cy="400110"/>
+          </a:xfrm>
+          <a:prstGeom prst="rect">
+            <a:avLst/>
+          </a:prstGeom>
+          <a:noFill/>
+        </p:spPr>
+        <p:txBody>
+          <a:bodyPr wrap="square" rtlCol="0">
+            <a:spAutoFit/>
+          </a:bodyPr>
+          <a:lstStyle/>
+          <a:p>
+            <a:pPr algn="ctr"/>
+            <a:r>
+              <a:rPr lang="en-US" sz="2000" dirty="0"/>
+              <a:t>Pax</a:t>
+            </a:r>
+          </a:p>
+        </p:txBody>
+      </p:sp>
+      <p:sp>
+        <p:nvSpPr>
+          <p:cNvPr id="10" name="&quot;No&quot; Symbol 9">
+            <a:extLst>
+              <a:ext uri="{FF2B5EF4-FFF2-40B4-BE49-F238E27FC236}">
+                <a16:creationId xmlns:a16="http://schemas.microsoft.com/office/drawing/2014/main" id="{B6D1B314-D93C-EEF9-D30B-321FD65D2B93}"/>
+              </a:ext>
+            </a:extLst>
+          </p:cNvPr>
+          <p:cNvSpPr/>
+          <p:nvPr/>
+        </p:nvSpPr>
+        <p:spPr>
+          <a:xfrm>
+            <a:off x="6766975" y="3697778"/>
+            <a:ext cx="478156" cy="478156"/>
+          </a:xfrm>
+          <a:prstGeom prst="noSmoking">
+            <a:avLst>
+              <a:gd name="adj" fmla="val 8121"/>
+            </a:avLst>
+          </a:prstGeom>
+          <a:solidFill>
+            <a:schemeClr val="bg1">
+              <a:lumMod val="75000"/>
+            </a:schemeClr>
+          </a:solidFill>
+          <a:ln>
+            <a:solidFill>
+              <a:schemeClr val="bg1">
+                <a:lumMod val="50000"/>
+              </a:schemeClr>
+            </a:solidFill>
+          </a:ln>
+        </p:spPr>
+        <p:style>
+          <a:lnRef idx="2">
+            <a:schemeClr val="accent1">
+              <a:shade val="15000"/>
+            </a:schemeClr>
+          </a:lnRef>
+          <a:fillRef idx="1">
+            <a:schemeClr val="accent1"/>
+          </a:fillRef>
+          <a:effectRef idx="0">
+            <a:schemeClr val="accent1"/>
+          </a:effectRef>
+          <a:fontRef idx="minor">
+            <a:schemeClr val="lt1"/>
+          </a:fontRef>
+        </p:style>
+        <p:txBody>
+          <a:bodyPr rtlCol="0" anchor="ctr"/>
+          <a:lstStyle/>
+          <a:p>
+            <a:pPr algn="ctr"/>
+            <a:endParaRPr lang="en-US">
+              <a:solidFill>
+                <a:schemeClr val="tx1"/>
+              </a:solidFill>
+            </a:endParaRPr>
+          </a:p>
+        </p:txBody>
+      </p:sp>
+      <p:sp>
+        <p:nvSpPr>
+          <p:cNvPr id="13" name="TextBox 12">
+            <a:extLst>
+              <a:ext uri="{FF2B5EF4-FFF2-40B4-BE49-F238E27FC236}">
+                <a16:creationId xmlns:a16="http://schemas.microsoft.com/office/drawing/2014/main" id="{8CF861D6-6AD5-94A7-1B65-CC5190C38E44}"/>
+              </a:ext>
+            </a:extLst>
+          </p:cNvPr>
+          <p:cNvSpPr txBox="1"/>
+          <p:nvPr/>
+        </p:nvSpPr>
+        <p:spPr>
+          <a:xfrm>
+            <a:off x="3546350" y="1582391"/>
+            <a:ext cx="884701" cy="400110"/>
+          </a:xfrm>
+          <a:prstGeom prst="rect">
+            <a:avLst/>
+          </a:prstGeom>
+          <a:noFill/>
+        </p:spPr>
+        <p:txBody>
+          <a:bodyPr wrap="square" rtlCol="0">
+            <a:spAutoFit/>
+          </a:bodyPr>
+          <a:lstStyle/>
+          <a:p>
+            <a:r>
+              <a:rPr lang="en-US" sz="2000" dirty="0"/>
+              <a:t>Alt (ft)</a:t>
+            </a:r>
+          </a:p>
+        </p:txBody>
+      </p:sp>
+      <p:cxnSp>
+        <p:nvCxnSpPr>
+          <p:cNvPr id="14" name="Straight Connector 13">
+            <a:extLst>
+              <a:ext uri="{FF2B5EF4-FFF2-40B4-BE49-F238E27FC236}">
+                <a16:creationId xmlns:a16="http://schemas.microsoft.com/office/drawing/2014/main" id="{49F27E44-4873-6EAC-A83E-5CB55C410D85}"/>
+              </a:ext>
+            </a:extLst>
+          </p:cNvPr>
+          <p:cNvCxnSpPr>
+            <a:cxnSpLocks/>
+          </p:cNvCxnSpPr>
+          <p:nvPr/>
+        </p:nvCxnSpPr>
+        <p:spPr>
+          <a:xfrm flipH="1">
+            <a:off x="6081977" y="1539600"/>
+            <a:ext cx="5322" cy="4382735"/>
+          </a:xfrm>
+          <a:prstGeom prst="line">
+            <a:avLst/>
+          </a:prstGeom>
+          <a:ln>
+            <a:solidFill>
+              <a:schemeClr val="bg1">
+                <a:lumMod val="75000"/>
+              </a:schemeClr>
+            </a:solidFill>
+          </a:ln>
+        </p:spPr>
+        <p:style>
+          <a:lnRef idx="2">
+            <a:schemeClr val="accent1"/>
+          </a:lnRef>
+          <a:fillRef idx="0">
+            <a:schemeClr val="accent1"/>
+          </a:fillRef>
+          <a:effectRef idx="1">
+            <a:schemeClr val="accent1"/>
+          </a:effectRef>
+          <a:fontRef idx="minor">
+            <a:schemeClr val="tx1"/>
+          </a:fontRef>
+        </p:style>
+      </p:cxnSp>
+      <p:cxnSp>
+        <p:nvCxnSpPr>
+          <p:cNvPr id="26" name="Straight Connector 25">
+            <a:extLst>
+              <a:ext uri="{FF2B5EF4-FFF2-40B4-BE49-F238E27FC236}">
+                <a16:creationId xmlns:a16="http://schemas.microsoft.com/office/drawing/2014/main" id="{F2FD1E27-64A7-2C63-88EF-F362C7CF9EBB}"/>
+              </a:ext>
+            </a:extLst>
+          </p:cNvPr>
+          <p:cNvCxnSpPr>
+            <a:cxnSpLocks/>
+          </p:cNvCxnSpPr>
+          <p:nvPr/>
+        </p:nvCxnSpPr>
+        <p:spPr>
+          <a:xfrm>
+            <a:off x="4314689" y="2763320"/>
+            <a:ext cx="3617841" cy="0"/>
+          </a:xfrm>
+          <a:prstGeom prst="line">
+            <a:avLst/>
+          </a:prstGeom>
+          <a:ln>
+            <a:solidFill>
+              <a:schemeClr val="bg1">
+                <a:lumMod val="75000"/>
+              </a:schemeClr>
+            </a:solidFill>
+            <a:prstDash val="dash"/>
+          </a:ln>
+        </p:spPr>
+        <p:style>
+          <a:lnRef idx="2">
+            <a:schemeClr val="accent1"/>
+          </a:lnRef>
+          <a:fillRef idx="0">
+            <a:schemeClr val="accent1"/>
+          </a:fillRef>
+          <a:effectRef idx="1">
+            <a:schemeClr val="accent1"/>
+          </a:effectRef>
+          <a:fontRef idx="minor">
+            <a:schemeClr val="tx1"/>
+          </a:fontRef>
+        </p:style>
+      </p:cxnSp>
+      <p:sp>
+        <p:nvSpPr>
+          <p:cNvPr id="16" name="TextBox 15">
+            <a:extLst>
+              <a:ext uri="{FF2B5EF4-FFF2-40B4-BE49-F238E27FC236}">
+                <a16:creationId xmlns:a16="http://schemas.microsoft.com/office/drawing/2014/main" id="{CCBD4F66-6061-B651-9356-B552A39DF82F}"/>
+              </a:ext>
+            </a:extLst>
+          </p:cNvPr>
+          <p:cNvSpPr txBox="1"/>
+          <p:nvPr/>
+        </p:nvSpPr>
+        <p:spPr>
+          <a:xfrm>
+            <a:off x="4306981" y="2057720"/>
+            <a:ext cx="3497203" cy="646331"/>
+          </a:xfrm>
+          <a:prstGeom prst="rect">
+            <a:avLst/>
+          </a:prstGeom>
+          <a:solidFill>
+            <a:schemeClr val="bg1"/>
+          </a:solidFill>
+        </p:spPr>
+        <p:txBody>
+          <a:bodyPr wrap="square" rtlCol="0">
+            <a:spAutoFit/>
+          </a:bodyPr>
+          <a:lstStyle/>
+          <a:p>
+            <a:pPr algn="ctr"/>
+            <a:r>
+              <a:rPr lang="en-US" dirty="0"/>
+              <a:t>Additional 10min for all occupants</a:t>
+            </a:r>
+          </a:p>
+        </p:txBody>
+      </p:sp>
+      <p:sp>
+        <p:nvSpPr>
+          <p:cNvPr id="44" name="&quot;No&quot; Symbol 43">
+            <a:extLst>
+              <a:ext uri="{FF2B5EF4-FFF2-40B4-BE49-F238E27FC236}">
+                <a16:creationId xmlns:a16="http://schemas.microsoft.com/office/drawing/2014/main" id="{EE34A09A-6AC1-39A5-3502-1AD5B34719EC}"/>
+              </a:ext>
+            </a:extLst>
+          </p:cNvPr>
+          <p:cNvSpPr/>
+          <p:nvPr/>
+        </p:nvSpPr>
+        <p:spPr>
+          <a:xfrm>
+            <a:off x="6766975" y="4466161"/>
+            <a:ext cx="478156" cy="478156"/>
+          </a:xfrm>
+          <a:prstGeom prst="noSmoking">
+            <a:avLst>
+              <a:gd name="adj" fmla="val 8121"/>
+            </a:avLst>
+          </a:prstGeom>
+          <a:solidFill>
+            <a:schemeClr val="bg1">
+              <a:lumMod val="75000"/>
+            </a:schemeClr>
+          </a:solidFill>
+          <a:ln>
+            <a:solidFill>
+              <a:schemeClr val="bg1">
+                <a:lumMod val="50000"/>
+              </a:schemeClr>
+            </a:solidFill>
+          </a:ln>
+        </p:spPr>
+        <p:style>
+          <a:lnRef idx="2">
+            <a:schemeClr val="accent1">
+              <a:shade val="15000"/>
+            </a:schemeClr>
+          </a:lnRef>
+          <a:fillRef idx="1">
+            <a:schemeClr val="accent1"/>
+          </a:fillRef>
+          <a:effectRef idx="0">
+            <a:schemeClr val="accent1"/>
+          </a:effectRef>
+          <a:fontRef idx="minor">
+            <a:schemeClr val="lt1"/>
+          </a:fontRef>
+        </p:style>
+        <p:txBody>
+          <a:bodyPr rtlCol="0" anchor="ctr"/>
+          <a:lstStyle/>
+          <a:p>
+            <a:pPr algn="ctr"/>
+            <a:endParaRPr lang="en-US">
+              <a:solidFill>
+                <a:schemeClr val="tx1"/>
+              </a:solidFill>
+            </a:endParaRPr>
+          </a:p>
+        </p:txBody>
+      </p:sp>
+      <p:sp>
+        <p:nvSpPr>
+          <p:cNvPr id="45" name="&quot;No&quot; Symbol 44">
+            <a:extLst>
+              <a:ext uri="{FF2B5EF4-FFF2-40B4-BE49-F238E27FC236}">
+                <a16:creationId xmlns:a16="http://schemas.microsoft.com/office/drawing/2014/main" id="{FD4CF258-A231-815C-708A-E61DBBFFFDB3}"/>
+              </a:ext>
+            </a:extLst>
+          </p:cNvPr>
+          <p:cNvSpPr/>
+          <p:nvPr/>
+        </p:nvSpPr>
+        <p:spPr>
+          <a:xfrm>
+            <a:off x="6766975" y="5271563"/>
+            <a:ext cx="478156" cy="478156"/>
+          </a:xfrm>
+          <a:prstGeom prst="noSmoking">
+            <a:avLst>
+              <a:gd name="adj" fmla="val 8121"/>
+            </a:avLst>
+          </a:prstGeom>
+          <a:solidFill>
+            <a:schemeClr val="bg1">
+              <a:lumMod val="75000"/>
+            </a:schemeClr>
+          </a:solidFill>
+          <a:ln>
+            <a:solidFill>
+              <a:schemeClr val="bg1">
+                <a:lumMod val="50000"/>
+              </a:schemeClr>
+            </a:solidFill>
+          </a:ln>
+        </p:spPr>
+        <p:style>
+          <a:lnRef idx="2">
+            <a:schemeClr val="accent1">
+              <a:shade val="15000"/>
+            </a:schemeClr>
+          </a:lnRef>
+          <a:fillRef idx="1">
+            <a:schemeClr val="accent1"/>
+          </a:fillRef>
+          <a:effectRef idx="0">
+            <a:schemeClr val="accent1"/>
+          </a:effectRef>
+          <a:fontRef idx="minor">
+            <a:schemeClr val="lt1"/>
+          </a:fontRef>
+        </p:style>
+        <p:txBody>
+          <a:bodyPr rtlCol="0" anchor="ctr"/>
+          <a:lstStyle/>
+          <a:p>
+            <a:pPr algn="ctr"/>
+            <a:endParaRPr lang="en-US">
+              <a:solidFill>
+                <a:schemeClr val="tx1"/>
+              </a:solidFill>
+            </a:endParaRPr>
+          </a:p>
+        </p:txBody>
+      </p:sp>
+      <p:sp>
+        <p:nvSpPr>
+          <p:cNvPr id="46" name="&quot;No&quot; Symbol 45">
+            <a:extLst>
+              <a:ext uri="{FF2B5EF4-FFF2-40B4-BE49-F238E27FC236}">
+                <a16:creationId xmlns:a16="http://schemas.microsoft.com/office/drawing/2014/main" id="{2319DCC1-153E-460A-6B63-7BFF2B37EEAD}"/>
+              </a:ext>
+            </a:extLst>
+          </p:cNvPr>
+          <p:cNvSpPr/>
+          <p:nvPr/>
+        </p:nvSpPr>
+        <p:spPr>
+          <a:xfrm>
+            <a:off x="4951633" y="5299345"/>
+            <a:ext cx="478156" cy="478156"/>
+          </a:xfrm>
+          <a:prstGeom prst="noSmoking">
+            <a:avLst>
+              <a:gd name="adj" fmla="val 8121"/>
+            </a:avLst>
+          </a:prstGeom>
+          <a:solidFill>
+            <a:schemeClr val="bg1">
+              <a:lumMod val="75000"/>
+            </a:schemeClr>
+          </a:solidFill>
+          <a:ln>
+            <a:solidFill>
+              <a:schemeClr val="bg1">
+                <a:lumMod val="50000"/>
+              </a:schemeClr>
+            </a:solidFill>
+          </a:ln>
+        </p:spPr>
+        <p:style>
+          <a:lnRef idx="2">
+            <a:schemeClr val="accent1">
+              <a:shade val="15000"/>
+            </a:schemeClr>
+          </a:lnRef>
+          <a:fillRef idx="1">
+            <a:schemeClr val="accent1"/>
+          </a:fillRef>
+          <a:effectRef idx="0">
+            <a:schemeClr val="accent1"/>
+          </a:effectRef>
+          <a:fontRef idx="minor">
+            <a:schemeClr val="lt1"/>
+          </a:fontRef>
+        </p:style>
+        <p:txBody>
+          <a:bodyPr rtlCol="0" anchor="ctr"/>
+          <a:lstStyle/>
+          <a:p>
+            <a:pPr algn="ctr"/>
+            <a:endParaRPr lang="en-US">
+              <a:solidFill>
+                <a:schemeClr val="tx1"/>
+              </a:solidFill>
+            </a:endParaRPr>
+          </a:p>
+        </p:txBody>
+      </p:sp>
+      <p:sp>
+        <p:nvSpPr>
+          <p:cNvPr id="47" name="TextBox 46">
+            <a:extLst>
+              <a:ext uri="{FF2B5EF4-FFF2-40B4-BE49-F238E27FC236}">
+                <a16:creationId xmlns:a16="http://schemas.microsoft.com/office/drawing/2014/main" id="{76194789-0004-4936-F3FA-ED1CFEF5DED6}"/>
+              </a:ext>
+            </a:extLst>
+          </p:cNvPr>
+          <p:cNvSpPr txBox="1"/>
+          <p:nvPr/>
+        </p:nvSpPr>
+        <p:spPr>
+          <a:xfrm>
+            <a:off x="4441694" y="4418292"/>
+            <a:ext cx="1607489" cy="646331"/>
+          </a:xfrm>
+          <a:prstGeom prst="rect">
+            <a:avLst/>
+          </a:prstGeom>
+          <a:solidFill>
+            <a:schemeClr val="bg1"/>
+          </a:solidFill>
+        </p:spPr>
+        <p:txBody>
+          <a:bodyPr wrap="square" rtlCol="0">
+            <a:spAutoFit/>
+          </a:bodyPr>
+          <a:lstStyle/>
+          <a:p>
+            <a:pPr algn="ctr"/>
+            <a:r>
+              <a:rPr lang="en-US" dirty="0"/>
+              <a:t>&gt;30min?</a:t>
+            </a:r>
+          </a:p>
+          <a:p>
+            <a:pPr algn="ctr"/>
+            <a:r>
+              <a:rPr lang="en-US" dirty="0"/>
+              <a:t>Must Use</a:t>
+            </a:r>
+          </a:p>
+        </p:txBody>
+      </p:sp>
+      <p:sp>
+        <p:nvSpPr>
+          <p:cNvPr id="48" name="TextBox 47">
+            <a:extLst>
+              <a:ext uri="{FF2B5EF4-FFF2-40B4-BE49-F238E27FC236}">
+                <a16:creationId xmlns:a16="http://schemas.microsoft.com/office/drawing/2014/main" id="{D29697A2-0300-B894-DE5E-77CA900DADFD}"/>
+              </a:ext>
+            </a:extLst>
+          </p:cNvPr>
+          <p:cNvSpPr txBox="1"/>
+          <p:nvPr/>
+        </p:nvSpPr>
+        <p:spPr>
+          <a:xfrm>
+            <a:off x="4382955" y="3782282"/>
+            <a:ext cx="1607489" cy="369332"/>
+          </a:xfrm>
+          <a:prstGeom prst="rect">
+            <a:avLst/>
+          </a:prstGeom>
+          <a:solidFill>
+            <a:schemeClr val="bg1"/>
+          </a:solidFill>
+        </p:spPr>
+        <p:txBody>
+          <a:bodyPr wrap="square" rtlCol="0">
+            <a:spAutoFit/>
+          </a:bodyPr>
+          <a:lstStyle/>
+          <a:p>
+            <a:pPr algn="ctr"/>
+            <a:r>
+              <a:rPr lang="en-US" dirty="0">
+                <a:solidFill>
+                  <a:srgbClr val="FF0000"/>
+                </a:solidFill>
+              </a:rPr>
+              <a:t>Must Use</a:t>
+            </a:r>
+          </a:p>
+        </p:txBody>
+      </p:sp>
+      <p:sp>
+        <p:nvSpPr>
+          <p:cNvPr id="49" name="TextBox 48">
+            <a:extLst>
+              <a:ext uri="{FF2B5EF4-FFF2-40B4-BE49-F238E27FC236}">
+                <a16:creationId xmlns:a16="http://schemas.microsoft.com/office/drawing/2014/main" id="{3FF3B568-8243-5CD7-B0A9-E25448EFB240}"/>
+              </a:ext>
+            </a:extLst>
+          </p:cNvPr>
+          <p:cNvSpPr txBox="1"/>
+          <p:nvPr/>
+        </p:nvSpPr>
+        <p:spPr>
+          <a:xfrm>
+            <a:off x="4382955" y="3009299"/>
+            <a:ext cx="1607489" cy="369332"/>
+          </a:xfrm>
+          <a:prstGeom prst="rect">
+            <a:avLst/>
+          </a:prstGeom>
+          <a:solidFill>
+            <a:schemeClr val="bg1"/>
+          </a:solidFill>
+        </p:spPr>
+        <p:txBody>
+          <a:bodyPr wrap="square" rtlCol="0">
+            <a:spAutoFit/>
+          </a:bodyPr>
+          <a:lstStyle/>
+          <a:p>
+            <a:pPr algn="ctr"/>
+            <a:r>
+              <a:rPr lang="en-US" dirty="0">
+                <a:solidFill>
+                  <a:srgbClr val="FF0000"/>
+                </a:solidFill>
+              </a:rPr>
+              <a:t>Must Use</a:t>
+            </a:r>
+          </a:p>
+        </p:txBody>
+      </p:sp>
+      <p:sp>
+        <p:nvSpPr>
+          <p:cNvPr id="50" name="TextBox 49">
+            <a:extLst>
+              <a:ext uri="{FF2B5EF4-FFF2-40B4-BE49-F238E27FC236}">
+                <a16:creationId xmlns:a16="http://schemas.microsoft.com/office/drawing/2014/main" id="{1319DF31-61A9-D1D2-00E3-ADC0A147F5C6}"/>
+              </a:ext>
+            </a:extLst>
+          </p:cNvPr>
+          <p:cNvSpPr txBox="1"/>
+          <p:nvPr/>
+        </p:nvSpPr>
+        <p:spPr>
+          <a:xfrm>
+            <a:off x="6196695" y="2847411"/>
+            <a:ext cx="1607489" cy="646331"/>
+          </a:xfrm>
+          <a:prstGeom prst="rect">
+            <a:avLst/>
+          </a:prstGeom>
+          <a:solidFill>
+            <a:schemeClr val="bg1"/>
+          </a:solidFill>
+        </p:spPr>
+        <p:txBody>
+          <a:bodyPr wrap="square" rtlCol="0">
+            <a:spAutoFit/>
+          </a:bodyPr>
+          <a:lstStyle/>
+          <a:p>
+            <a:pPr algn="ctr"/>
+            <a:r>
+              <a:rPr lang="en-US" dirty="0">
+                <a:solidFill>
+                  <a:srgbClr val="0070C0"/>
+                </a:solidFill>
+              </a:rPr>
+              <a:t>Must Be Provided</a:t>
+            </a:r>
+          </a:p>
+        </p:txBody>
+      </p:sp>
+      <p:cxnSp>
+        <p:nvCxnSpPr>
+          <p:cNvPr id="51" name="Straight Connector 50">
+            <a:extLst>
+              <a:ext uri="{FF2B5EF4-FFF2-40B4-BE49-F238E27FC236}">
+                <a16:creationId xmlns:a16="http://schemas.microsoft.com/office/drawing/2014/main" id="{8315C0B5-6F41-CA08-3F23-03862455199C}"/>
+              </a:ext>
+            </a:extLst>
+          </p:cNvPr>
+          <p:cNvCxnSpPr>
+            <a:cxnSpLocks/>
+          </p:cNvCxnSpPr>
+          <p:nvPr/>
+        </p:nvCxnSpPr>
+        <p:spPr>
+          <a:xfrm>
+            <a:off x="4306981" y="3559188"/>
+            <a:ext cx="3617841" cy="0"/>
+          </a:xfrm>
+          <a:prstGeom prst="line">
+            <a:avLst/>
+          </a:prstGeom>
+          <a:ln>
+            <a:solidFill>
+              <a:schemeClr val="bg1">
+                <a:lumMod val="75000"/>
+              </a:schemeClr>
+            </a:solidFill>
+            <a:prstDash val="dash"/>
+          </a:ln>
+        </p:spPr>
+        <p:style>
+          <a:lnRef idx="2">
+            <a:schemeClr val="accent1"/>
+          </a:lnRef>
+          <a:fillRef idx="0">
+            <a:schemeClr val="accent1"/>
+          </a:fillRef>
+          <a:effectRef idx="1">
+            <a:schemeClr val="accent1"/>
+          </a:effectRef>
+          <a:fontRef idx="minor">
+            <a:schemeClr val="tx1"/>
+          </a:fontRef>
+        </p:style>
+      </p:cxnSp>
+      <p:cxnSp>
+        <p:nvCxnSpPr>
+          <p:cNvPr id="52" name="Straight Connector 51">
+            <a:extLst>
+              <a:ext uri="{FF2B5EF4-FFF2-40B4-BE49-F238E27FC236}">
+                <a16:creationId xmlns:a16="http://schemas.microsoft.com/office/drawing/2014/main" id="{026CCE70-F72F-A63C-C52A-C25E9C87AF63}"/>
+              </a:ext>
+            </a:extLst>
+          </p:cNvPr>
+          <p:cNvCxnSpPr>
+            <a:cxnSpLocks/>
+          </p:cNvCxnSpPr>
+          <p:nvPr/>
+        </p:nvCxnSpPr>
+        <p:spPr>
+          <a:xfrm>
+            <a:off x="4290806" y="4321188"/>
+            <a:ext cx="3617841" cy="0"/>
+          </a:xfrm>
+          <a:prstGeom prst="line">
+            <a:avLst/>
+          </a:prstGeom>
+          <a:ln>
+            <a:solidFill>
+              <a:schemeClr val="bg1">
+                <a:lumMod val="75000"/>
+              </a:schemeClr>
+            </a:solidFill>
+            <a:prstDash val="dash"/>
+          </a:ln>
+        </p:spPr>
+        <p:style>
+          <a:lnRef idx="2">
+            <a:schemeClr val="accent1"/>
+          </a:lnRef>
+          <a:fillRef idx="0">
+            <a:schemeClr val="accent1"/>
+          </a:fillRef>
+          <a:effectRef idx="1">
+            <a:schemeClr val="accent1"/>
+          </a:effectRef>
+          <a:fontRef idx="minor">
+            <a:schemeClr val="tx1"/>
+          </a:fontRef>
+        </p:style>
+      </p:cxnSp>
+      <p:cxnSp>
+        <p:nvCxnSpPr>
+          <p:cNvPr id="53" name="Straight Connector 52">
+            <a:extLst>
+              <a:ext uri="{FF2B5EF4-FFF2-40B4-BE49-F238E27FC236}">
+                <a16:creationId xmlns:a16="http://schemas.microsoft.com/office/drawing/2014/main" id="{F60E1CF6-0E15-2E2E-1590-81AD55F49D27}"/>
+              </a:ext>
+            </a:extLst>
+          </p:cNvPr>
+          <p:cNvCxnSpPr>
+            <a:cxnSpLocks/>
+          </p:cNvCxnSpPr>
+          <p:nvPr/>
+        </p:nvCxnSpPr>
+        <p:spPr>
+          <a:xfrm>
+            <a:off x="4308499" y="5117056"/>
+            <a:ext cx="3617841" cy="0"/>
+          </a:xfrm>
+          <a:prstGeom prst="line">
+            <a:avLst/>
+          </a:prstGeom>
+          <a:ln>
+            <a:solidFill>
+              <a:schemeClr val="bg1">
+                <a:lumMod val="75000"/>
+              </a:schemeClr>
+            </a:solidFill>
+            <a:prstDash val="dash"/>
+          </a:ln>
+        </p:spPr>
+        <p:style>
+          <a:lnRef idx="2">
+            <a:schemeClr val="accent1"/>
+          </a:lnRef>
+          <a:fillRef idx="0">
+            <a:schemeClr val="accent1"/>
+          </a:fillRef>
+          <a:effectRef idx="1">
+            <a:schemeClr val="accent1"/>
+          </a:effectRef>
+          <a:fontRef idx="minor">
+            <a:schemeClr val="tx1"/>
+          </a:fontRef>
+        </p:style>
+      </p:cxnSp>
+      <p:cxnSp>
+        <p:nvCxnSpPr>
+          <p:cNvPr id="56" name="Straight Connector 55">
+            <a:extLst>
+              <a:ext uri="{FF2B5EF4-FFF2-40B4-BE49-F238E27FC236}">
+                <a16:creationId xmlns:a16="http://schemas.microsoft.com/office/drawing/2014/main" id="{2B45BE94-2E45-811E-59C7-0242E99C199D}"/>
+              </a:ext>
+            </a:extLst>
+          </p:cNvPr>
+          <p:cNvCxnSpPr>
+            <a:cxnSpLocks/>
+          </p:cNvCxnSpPr>
+          <p:nvPr/>
+        </p:nvCxnSpPr>
+        <p:spPr>
+          <a:xfrm flipH="1">
+            <a:off x="4314689" y="1541721"/>
+            <a:ext cx="11531" cy="4380614"/>
+          </a:xfrm>
+          <a:prstGeom prst="line">
+            <a:avLst/>
+          </a:prstGeom>
+          <a:ln>
+            <a:solidFill>
+              <a:schemeClr val="bg1">
+                <a:lumMod val="75000"/>
+              </a:schemeClr>
+            </a:solidFill>
+          </a:ln>
+        </p:spPr>
+        <p:style>
+          <a:lnRef idx="2">
+            <a:schemeClr val="accent1"/>
+          </a:lnRef>
+          <a:fillRef idx="0">
+            <a:schemeClr val="accent1"/>
+          </a:fillRef>
+          <a:effectRef idx="1">
+            <a:schemeClr val="accent1"/>
+          </a:effectRef>
+          <a:fontRef idx="minor">
+            <a:schemeClr val="tx1"/>
+          </a:fontRef>
+        </p:style>
+      </p:cxnSp>
+      <p:sp>
+        <p:nvSpPr>
+          <p:cNvPr id="59" name="TextBox 58">
+            <a:extLst>
+              <a:ext uri="{FF2B5EF4-FFF2-40B4-BE49-F238E27FC236}">
+                <a16:creationId xmlns:a16="http://schemas.microsoft.com/office/drawing/2014/main" id="{2283AF5D-0B03-78D4-C565-74A8E5762678}"/>
+              </a:ext>
+            </a:extLst>
+          </p:cNvPr>
+          <p:cNvSpPr txBox="1"/>
+          <p:nvPr/>
+        </p:nvSpPr>
+        <p:spPr>
+          <a:xfrm>
+            <a:off x="3587305" y="3382331"/>
+            <a:ext cx="729455" cy="338554"/>
+          </a:xfrm>
+          <a:prstGeom prst="rect">
+            <a:avLst/>
+          </a:prstGeom>
+          <a:noFill/>
+        </p:spPr>
+        <p:txBody>
+          <a:bodyPr wrap="square" rtlCol="0">
+            <a:spAutoFit/>
+          </a:bodyPr>
+          <a:lstStyle/>
+          <a:p>
+            <a:pPr algn="r"/>
+            <a:r>
+              <a:rPr lang="en-US" sz="1600" b="1" dirty="0"/>
+              <a:t>15</a:t>
+            </a:r>
+            <a:r>
+              <a:rPr lang="en-US" sz="1200" dirty="0"/>
+              <a:t>,</a:t>
+            </a:r>
+            <a:r>
+              <a:rPr lang="en-US" sz="1050" dirty="0"/>
+              <a:t>000</a:t>
+            </a:r>
+            <a:endParaRPr lang="en-US" sz="1200" dirty="0"/>
+          </a:p>
+        </p:txBody>
+      </p:sp>
+      <p:sp>
+        <p:nvSpPr>
+          <p:cNvPr id="60" name="TextBox 59">
+            <a:extLst>
+              <a:ext uri="{FF2B5EF4-FFF2-40B4-BE49-F238E27FC236}">
+                <a16:creationId xmlns:a16="http://schemas.microsoft.com/office/drawing/2014/main" id="{863802FD-1933-BB9C-1868-26B9DBFAFF55}"/>
+              </a:ext>
+            </a:extLst>
+          </p:cNvPr>
+          <p:cNvSpPr txBox="1"/>
+          <p:nvPr/>
+        </p:nvSpPr>
+        <p:spPr>
+          <a:xfrm>
+            <a:off x="3587131" y="4155427"/>
+            <a:ext cx="729455" cy="338554"/>
+          </a:xfrm>
+          <a:prstGeom prst="rect">
+            <a:avLst/>
+          </a:prstGeom>
+          <a:noFill/>
+        </p:spPr>
+        <p:txBody>
+          <a:bodyPr wrap="square" rtlCol="0">
+            <a:spAutoFit/>
+          </a:bodyPr>
+          <a:lstStyle/>
+          <a:p>
+            <a:pPr algn="r"/>
+            <a:r>
+              <a:rPr lang="en-US" sz="1600" b="1" dirty="0"/>
+              <a:t>14</a:t>
+            </a:r>
+            <a:r>
+              <a:rPr lang="en-US" sz="1200" dirty="0"/>
+              <a:t>,</a:t>
+            </a:r>
+            <a:r>
+              <a:rPr lang="en-US" sz="1050" dirty="0"/>
+              <a:t>000</a:t>
+            </a:r>
+            <a:endParaRPr lang="en-US" sz="1200" dirty="0"/>
+          </a:p>
+        </p:txBody>
+      </p:sp>
+      <p:sp>
+        <p:nvSpPr>
+          <p:cNvPr id="61" name="TextBox 60">
+            <a:extLst>
+              <a:ext uri="{FF2B5EF4-FFF2-40B4-BE49-F238E27FC236}">
+                <a16:creationId xmlns:a16="http://schemas.microsoft.com/office/drawing/2014/main" id="{EFB09353-A615-2A8E-BD2D-4E3D9FADF995}"/>
+              </a:ext>
+            </a:extLst>
+          </p:cNvPr>
+          <p:cNvSpPr txBox="1"/>
+          <p:nvPr/>
+        </p:nvSpPr>
+        <p:spPr>
+          <a:xfrm>
+            <a:off x="3585993" y="4946148"/>
+            <a:ext cx="729455" cy="338554"/>
+          </a:xfrm>
+          <a:prstGeom prst="rect">
+            <a:avLst/>
+          </a:prstGeom>
+          <a:noFill/>
+        </p:spPr>
+        <p:txBody>
+          <a:bodyPr wrap="square" rtlCol="0">
+            <a:spAutoFit/>
+          </a:bodyPr>
+          <a:lstStyle/>
+          <a:p>
+            <a:pPr algn="r"/>
+            <a:r>
+              <a:rPr lang="en-US" sz="1600" b="1" dirty="0"/>
+              <a:t>12</a:t>
+            </a:r>
+            <a:r>
+              <a:rPr lang="en-US" sz="1200" dirty="0"/>
+              <a:t>,</a:t>
+            </a:r>
+            <a:r>
+              <a:rPr lang="en-US" sz="1400" dirty="0"/>
+              <a:t>5</a:t>
+            </a:r>
+            <a:r>
+              <a:rPr lang="en-US" sz="1050" dirty="0"/>
+              <a:t>00</a:t>
+            </a:r>
+            <a:endParaRPr lang="en-US" sz="1200" dirty="0"/>
+          </a:p>
+        </p:txBody>
+      </p:sp>
+    </p:spTree>
+    <p:extLst>
+      <p:ext uri="{BB962C8B-B14F-4D97-AF65-F5344CB8AC3E}">
+        <p14:creationId xmlns:p14="http://schemas.microsoft.com/office/powerpoint/2010/main" val="1264332990"/>
+      </p:ext>
+    </p:extLst>
+  </p:cSld>
+  <p:clrMapOvr>
+    <a:masterClrMapping/>
+  </p:clrMapOvr>
+</p:sld>
+</file>
+
+<file path=ppt/slides/slide4.xml><?xml version="1.0" encoding="utf-8"?>
+<p:sld xmlns:a="http://schemas.openxmlformats.org/drawingml/2006/main" xmlns:r="http://schemas.openxmlformats.org/officeDocument/2006/relationships" xmlns:p="http://schemas.openxmlformats.org/presentationml/2006/main">
+  <p:cSld>
+    <p:spTree>
+      <p:nvGrpSpPr>
         <p:cNvPr id="1" name=""/>
         <p:cNvGrpSpPr/>
         <p:nvPr/>
@@ -5247,7 +6406,7 @@
 </p:sld>
 </file>
 
-<file path=ppt/slides/slide4.xml><?xml version="1.0" encoding="utf-8"?>
+<file path=ppt/slides/slide5.xml><?xml version="1.0" encoding="utf-8"?>
 <p:sld xmlns:a="http://schemas.openxmlformats.org/drawingml/2006/main" xmlns:r="http://schemas.openxmlformats.org/officeDocument/2006/relationships" xmlns:p="http://schemas.openxmlformats.org/presentationml/2006/main">
   <p:cSld>
     <p:spTree>

</xml_diff>

<commit_message>
Fixed FL250 for oxygen requiremets
</commit_message>
<xml_diff>
--- a/docs/Tiles.pptx
+++ b/docs/Tiles.pptx
@@ -274,7 +274,7 @@
           <a:p>
             <a:fld id="{46DA5C4A-B072-FB48-84F0-865EE8F0D843}" type="datetimeFigureOut">
               <a:rPr lang="en-US" smtClean="0"/>
-              <a:t>11/3/25</a:t>
+              <a:t>11/6/25</a:t>
             </a:fld>
             <a:endParaRPr lang="en-US"/>
           </a:p>
@@ -472,7 +472,7 @@
           <a:p>
             <a:fld id="{46DA5C4A-B072-FB48-84F0-865EE8F0D843}" type="datetimeFigureOut">
               <a:rPr lang="en-US" smtClean="0"/>
-              <a:t>11/3/25</a:t>
+              <a:t>11/6/25</a:t>
             </a:fld>
             <a:endParaRPr lang="en-US"/>
           </a:p>
@@ -680,7 +680,7 @@
           <a:p>
             <a:fld id="{46DA5C4A-B072-FB48-84F0-865EE8F0D843}" type="datetimeFigureOut">
               <a:rPr lang="en-US" smtClean="0"/>
-              <a:t>11/3/25</a:t>
+              <a:t>11/6/25</a:t>
             </a:fld>
             <a:endParaRPr lang="en-US"/>
           </a:p>
@@ -878,7 +878,7 @@
           <a:p>
             <a:fld id="{46DA5C4A-B072-FB48-84F0-865EE8F0D843}" type="datetimeFigureOut">
               <a:rPr lang="en-US" smtClean="0"/>
-              <a:t>11/3/25</a:t>
+              <a:t>11/6/25</a:t>
             </a:fld>
             <a:endParaRPr lang="en-US"/>
           </a:p>
@@ -1153,7 +1153,7 @@
           <a:p>
             <a:fld id="{46DA5C4A-B072-FB48-84F0-865EE8F0D843}" type="datetimeFigureOut">
               <a:rPr lang="en-US" smtClean="0"/>
-              <a:t>11/3/25</a:t>
+              <a:t>11/6/25</a:t>
             </a:fld>
             <a:endParaRPr lang="en-US"/>
           </a:p>
@@ -1418,7 +1418,7 @@
           <a:p>
             <a:fld id="{46DA5C4A-B072-FB48-84F0-865EE8F0D843}" type="datetimeFigureOut">
               <a:rPr lang="en-US" smtClean="0"/>
-              <a:t>11/3/25</a:t>
+              <a:t>11/6/25</a:t>
             </a:fld>
             <a:endParaRPr lang="en-US"/>
           </a:p>
@@ -1830,7 +1830,7 @@
           <a:p>
             <a:fld id="{46DA5C4A-B072-FB48-84F0-865EE8F0D843}" type="datetimeFigureOut">
               <a:rPr lang="en-US" smtClean="0"/>
-              <a:t>11/3/25</a:t>
+              <a:t>11/6/25</a:t>
             </a:fld>
             <a:endParaRPr lang="en-US"/>
           </a:p>
@@ -1971,7 +1971,7 @@
           <a:p>
             <a:fld id="{46DA5C4A-B072-FB48-84F0-865EE8F0D843}" type="datetimeFigureOut">
               <a:rPr lang="en-US" smtClean="0"/>
-              <a:t>11/3/25</a:t>
+              <a:t>11/6/25</a:t>
             </a:fld>
             <a:endParaRPr lang="en-US"/>
           </a:p>
@@ -2084,7 +2084,7 @@
           <a:p>
             <a:fld id="{46DA5C4A-B072-FB48-84F0-865EE8F0D843}" type="datetimeFigureOut">
               <a:rPr lang="en-US" smtClean="0"/>
-              <a:t>11/3/25</a:t>
+              <a:t>11/6/25</a:t>
             </a:fld>
             <a:endParaRPr lang="en-US"/>
           </a:p>
@@ -2395,7 +2395,7 @@
           <a:p>
             <a:fld id="{46DA5C4A-B072-FB48-84F0-865EE8F0D843}" type="datetimeFigureOut">
               <a:rPr lang="en-US" smtClean="0"/>
-              <a:t>11/3/25</a:t>
+              <a:t>11/6/25</a:t>
             </a:fld>
             <a:endParaRPr lang="en-US"/>
           </a:p>
@@ -2683,7 +2683,7 @@
           <a:p>
             <a:fld id="{46DA5C4A-B072-FB48-84F0-865EE8F0D843}" type="datetimeFigureOut">
               <a:rPr lang="en-US" smtClean="0"/>
-              <a:t>11/3/25</a:t>
+              <a:t>11/6/25</a:t>
             </a:fld>
             <a:endParaRPr lang="en-US"/>
           </a:p>
@@ -2924,7 +2924,7 @@
           <a:p>
             <a:fld id="{46DA5C4A-B072-FB48-84F0-865EE8F0D843}" type="datetimeFigureOut">
               <a:rPr lang="en-US" smtClean="0"/>
-              <a:t>11/3/25</a:t>
+              <a:t>11/6/25</a:t>
             </a:fld>
             <a:endParaRPr lang="en-US"/>
           </a:p>
@@ -5036,8 +5036,8 @@
         </p:nvSpPr>
         <p:spPr>
           <a:xfrm>
-            <a:off x="3595775" y="2561043"/>
-            <a:ext cx="729455" cy="400110"/>
+            <a:off x="3463594" y="2561043"/>
+            <a:ext cx="903319" cy="400110"/>
           </a:xfrm>
           <a:prstGeom prst="rect">
             <a:avLst/>
@@ -5053,7 +5053,7 @@
             <a:pPr algn="r"/>
             <a:r>
               <a:rPr lang="en-US" sz="2000" b="1" dirty="0"/>
-              <a:t>FL25</a:t>
+              <a:t>FL250</a:t>
             </a:r>
             <a:endParaRPr lang="en-US" sz="1600" dirty="0"/>
           </a:p>

</xml_diff>

<commit_message>
Added back altitude tracker
</commit_message>
<xml_diff>
--- a/docs/Tiles.pptx
+++ b/docs/Tiles.pptx
@@ -11,6 +11,7 @@
     <p:sldId id="258" r:id="rId5"/>
     <p:sldId id="261" r:id="rId6"/>
     <p:sldId id="259" r:id="rId7"/>
+    <p:sldId id="263" r:id="rId8"/>
   </p:sldIdLst>
   <p:sldSz cx="12192000" cy="6858000"/>
   <p:notesSz cx="6858000" cy="9144000"/>
@@ -275,7 +276,7 @@
           <a:p>
             <a:fld id="{46DA5C4A-B072-FB48-84F0-865EE8F0D843}" type="datetimeFigureOut">
               <a:rPr lang="en-US" smtClean="0"/>
-              <a:t>11/19/2025</a:t>
+              <a:t>11/20/25</a:t>
             </a:fld>
             <a:endParaRPr lang="en-US"/>
           </a:p>
@@ -473,7 +474,7 @@
           <a:p>
             <a:fld id="{46DA5C4A-B072-FB48-84F0-865EE8F0D843}" type="datetimeFigureOut">
               <a:rPr lang="en-US" smtClean="0"/>
-              <a:t>11/19/2025</a:t>
+              <a:t>11/20/25</a:t>
             </a:fld>
             <a:endParaRPr lang="en-US"/>
           </a:p>
@@ -681,7 +682,7 @@
           <a:p>
             <a:fld id="{46DA5C4A-B072-FB48-84F0-865EE8F0D843}" type="datetimeFigureOut">
               <a:rPr lang="en-US" smtClean="0"/>
-              <a:t>11/19/2025</a:t>
+              <a:t>11/20/25</a:t>
             </a:fld>
             <a:endParaRPr lang="en-US"/>
           </a:p>
@@ -879,7 +880,7 @@
           <a:p>
             <a:fld id="{46DA5C4A-B072-FB48-84F0-865EE8F0D843}" type="datetimeFigureOut">
               <a:rPr lang="en-US" smtClean="0"/>
-              <a:t>11/19/2025</a:t>
+              <a:t>11/20/25</a:t>
             </a:fld>
             <a:endParaRPr lang="en-US"/>
           </a:p>
@@ -1154,7 +1155,7 @@
           <a:p>
             <a:fld id="{46DA5C4A-B072-FB48-84F0-865EE8F0D843}" type="datetimeFigureOut">
               <a:rPr lang="en-US" smtClean="0"/>
-              <a:t>11/19/2025</a:t>
+              <a:t>11/20/25</a:t>
             </a:fld>
             <a:endParaRPr lang="en-US"/>
           </a:p>
@@ -1419,7 +1420,7 @@
           <a:p>
             <a:fld id="{46DA5C4A-B072-FB48-84F0-865EE8F0D843}" type="datetimeFigureOut">
               <a:rPr lang="en-US" smtClean="0"/>
-              <a:t>11/19/2025</a:t>
+              <a:t>11/20/25</a:t>
             </a:fld>
             <a:endParaRPr lang="en-US"/>
           </a:p>
@@ -1831,7 +1832,7 @@
           <a:p>
             <a:fld id="{46DA5C4A-B072-FB48-84F0-865EE8F0D843}" type="datetimeFigureOut">
               <a:rPr lang="en-US" smtClean="0"/>
-              <a:t>11/19/2025</a:t>
+              <a:t>11/20/25</a:t>
             </a:fld>
             <a:endParaRPr lang="en-US"/>
           </a:p>
@@ -1972,7 +1973,7 @@
           <a:p>
             <a:fld id="{46DA5C4A-B072-FB48-84F0-865EE8F0D843}" type="datetimeFigureOut">
               <a:rPr lang="en-US" smtClean="0"/>
-              <a:t>11/19/2025</a:t>
+              <a:t>11/20/25</a:t>
             </a:fld>
             <a:endParaRPr lang="en-US"/>
           </a:p>
@@ -2085,7 +2086,7 @@
           <a:p>
             <a:fld id="{46DA5C4A-B072-FB48-84F0-865EE8F0D843}" type="datetimeFigureOut">
               <a:rPr lang="en-US" smtClean="0"/>
-              <a:t>11/19/2025</a:t>
+              <a:t>11/20/25</a:t>
             </a:fld>
             <a:endParaRPr lang="en-US"/>
           </a:p>
@@ -2396,7 +2397,7 @@
           <a:p>
             <a:fld id="{46DA5C4A-B072-FB48-84F0-865EE8F0D843}" type="datetimeFigureOut">
               <a:rPr lang="en-US" smtClean="0"/>
-              <a:t>11/19/2025</a:t>
+              <a:t>11/20/25</a:t>
             </a:fld>
             <a:endParaRPr lang="en-US"/>
           </a:p>
@@ -2684,7 +2685,7 @@
           <a:p>
             <a:fld id="{46DA5C4A-B072-FB48-84F0-865EE8F0D843}" type="datetimeFigureOut">
               <a:rPr lang="en-US" smtClean="0"/>
-              <a:t>11/19/2025</a:t>
+              <a:t>11/20/25</a:t>
             </a:fld>
             <a:endParaRPr lang="en-US"/>
           </a:p>
@@ -2925,7 +2926,7 @@
           <a:p>
             <a:fld id="{46DA5C4A-B072-FB48-84F0-865EE8F0D843}" type="datetimeFigureOut">
               <a:rPr lang="en-US" smtClean="0"/>
-              <a:t>11/19/2025</a:t>
+              <a:t>11/20/25</a:t>
             </a:fld>
             <a:endParaRPr lang="en-US"/>
           </a:p>
@@ -9093,6 +9094,968 @@
 </p:sld>
 </file>
 
+<file path=ppt/slides/slide7.xml><?xml version="1.0" encoding="utf-8"?>
+<p:sld xmlns:a="http://schemas.openxmlformats.org/drawingml/2006/main" xmlns:r="http://schemas.openxmlformats.org/officeDocument/2006/relationships" xmlns:p="http://schemas.openxmlformats.org/presentationml/2006/main">
+  <p:cSld>
+    <p:spTree>
+      <p:nvGrpSpPr>
+        <p:cNvPr id="1" name=""/>
+        <p:cNvGrpSpPr/>
+        <p:nvPr/>
+      </p:nvGrpSpPr>
+      <p:grpSpPr>
+        <a:xfrm>
+          <a:off x="0" y="0"/>
+          <a:ext cx="0" cy="0"/>
+          <a:chOff x="0" y="0"/>
+          <a:chExt cx="0" cy="0"/>
+        </a:xfrm>
+      </p:grpSpPr>
+      <p:sp>
+        <p:nvSpPr>
+          <p:cNvPr id="33" name="Rectangle 32">
+            <a:extLst>
+              <a:ext uri="{FF2B5EF4-FFF2-40B4-BE49-F238E27FC236}">
+                <a16:creationId xmlns:a16="http://schemas.microsoft.com/office/drawing/2014/main" id="{BEFF6942-609B-1611-787B-5BDE36149411}"/>
+              </a:ext>
+            </a:extLst>
+          </p:cNvPr>
+          <p:cNvSpPr/>
+          <p:nvPr/>
+        </p:nvSpPr>
+        <p:spPr>
+          <a:xfrm>
+            <a:off x="7729771" y="1781413"/>
+            <a:ext cx="3253565" cy="457200"/>
+          </a:xfrm>
+          <a:prstGeom prst="rect">
+            <a:avLst/>
+          </a:prstGeom>
+          <a:solidFill>
+            <a:srgbClr val="FFFA57"/>
+          </a:solidFill>
+          <a:ln>
+            <a:noFill/>
+          </a:ln>
+        </p:spPr>
+        <p:style>
+          <a:lnRef idx="2">
+            <a:schemeClr val="accent1">
+              <a:shade val="15000"/>
+            </a:schemeClr>
+          </a:lnRef>
+          <a:fillRef idx="1">
+            <a:schemeClr val="accent1"/>
+          </a:fillRef>
+          <a:effectRef idx="0">
+            <a:schemeClr val="accent1"/>
+          </a:effectRef>
+          <a:fontRef idx="minor">
+            <a:schemeClr val="lt1"/>
+          </a:fontRef>
+        </p:style>
+        <p:txBody>
+          <a:bodyPr rtlCol="0" anchor="ctr"/>
+          <a:lstStyle/>
+          <a:p>
+            <a:pPr algn="ctr"/>
+            <a:endParaRPr lang="en-US"/>
+          </a:p>
+        </p:txBody>
+      </p:sp>
+      <p:sp>
+        <p:nvSpPr>
+          <p:cNvPr id="6" name="Rectangle 5">
+            <a:extLst>
+              <a:ext uri="{FF2B5EF4-FFF2-40B4-BE49-F238E27FC236}">
+                <a16:creationId xmlns:a16="http://schemas.microsoft.com/office/drawing/2014/main" id="{71062270-F254-427D-007F-B38B33A43B2E}"/>
+              </a:ext>
+            </a:extLst>
+          </p:cNvPr>
+          <p:cNvSpPr/>
+          <p:nvPr/>
+        </p:nvSpPr>
+        <p:spPr>
+          <a:xfrm>
+            <a:off x="1562980" y="1777820"/>
+            <a:ext cx="3253565" cy="914400"/>
+          </a:xfrm>
+          <a:prstGeom prst="rect">
+            <a:avLst/>
+          </a:prstGeom>
+          <a:solidFill>
+            <a:srgbClr val="FFFA57"/>
+          </a:solidFill>
+          <a:ln>
+            <a:noFill/>
+          </a:ln>
+        </p:spPr>
+        <p:style>
+          <a:lnRef idx="2">
+            <a:schemeClr val="accent1">
+              <a:shade val="15000"/>
+            </a:schemeClr>
+          </a:lnRef>
+          <a:fillRef idx="1">
+            <a:schemeClr val="accent1"/>
+          </a:fillRef>
+          <a:effectRef idx="0">
+            <a:schemeClr val="accent1"/>
+          </a:effectRef>
+          <a:fontRef idx="minor">
+            <a:schemeClr val="lt1"/>
+          </a:fontRef>
+        </p:style>
+        <p:txBody>
+          <a:bodyPr rtlCol="0" anchor="ctr"/>
+          <a:lstStyle/>
+          <a:p>
+            <a:pPr algn="ctr"/>
+            <a:endParaRPr lang="en-US"/>
+          </a:p>
+        </p:txBody>
+      </p:sp>
+      <p:sp>
+        <p:nvSpPr>
+          <p:cNvPr id="9" name="Rectangle 8">
+            <a:extLst>
+              <a:ext uri="{FF2B5EF4-FFF2-40B4-BE49-F238E27FC236}">
+                <a16:creationId xmlns:a16="http://schemas.microsoft.com/office/drawing/2014/main" id="{1CA4D178-2E0D-4861-252B-3120FF39F6D9}"/>
+              </a:ext>
+            </a:extLst>
+          </p:cNvPr>
+          <p:cNvSpPr/>
+          <p:nvPr/>
+        </p:nvSpPr>
+        <p:spPr>
+          <a:xfrm>
+            <a:off x="1562982" y="871879"/>
+            <a:ext cx="3253564" cy="914400"/>
+          </a:xfrm>
+          <a:prstGeom prst="rect">
+            <a:avLst/>
+          </a:prstGeom>
+          <a:solidFill>
+            <a:srgbClr val="FF0000"/>
+          </a:solidFill>
+          <a:ln>
+            <a:noFill/>
+          </a:ln>
+        </p:spPr>
+        <p:style>
+          <a:lnRef idx="2">
+            <a:schemeClr val="accent1">
+              <a:shade val="15000"/>
+            </a:schemeClr>
+          </a:lnRef>
+          <a:fillRef idx="1">
+            <a:schemeClr val="accent1"/>
+          </a:fillRef>
+          <a:effectRef idx="0">
+            <a:schemeClr val="accent1"/>
+          </a:effectRef>
+          <a:fontRef idx="minor">
+            <a:schemeClr val="lt1"/>
+          </a:fontRef>
+        </p:style>
+        <p:txBody>
+          <a:bodyPr rtlCol="0" anchor="ctr"/>
+          <a:lstStyle/>
+          <a:p>
+            <a:pPr algn="ctr"/>
+            <a:endParaRPr lang="en-US"/>
+          </a:p>
+        </p:txBody>
+      </p:sp>
+      <p:sp>
+        <p:nvSpPr>
+          <p:cNvPr id="10" name="TextBox 9">
+            <a:extLst>
+              <a:ext uri="{FF2B5EF4-FFF2-40B4-BE49-F238E27FC236}">
+                <a16:creationId xmlns:a16="http://schemas.microsoft.com/office/drawing/2014/main" id="{9BD39AB8-EAF1-01A2-53FF-FB44D1CE7FA1}"/>
+              </a:ext>
+            </a:extLst>
+          </p:cNvPr>
+          <p:cNvSpPr txBox="1"/>
+          <p:nvPr/>
+        </p:nvSpPr>
+        <p:spPr>
+          <a:xfrm>
+            <a:off x="-312779" y="2467257"/>
+            <a:ext cx="1913859" cy="461665"/>
+          </a:xfrm>
+          <a:prstGeom prst="rect">
+            <a:avLst/>
+          </a:prstGeom>
+          <a:noFill/>
+        </p:spPr>
+        <p:txBody>
+          <a:bodyPr wrap="square" rtlCol="0">
+            <a:spAutoFit/>
+          </a:bodyPr>
+          <a:lstStyle/>
+          <a:p>
+            <a:pPr algn="r"/>
+            <a:r>
+              <a:rPr lang="en-US" sz="2400" b="1" dirty="0"/>
+              <a:t>Cruise</a:t>
+            </a:r>
+            <a:endParaRPr lang="en-US" b="1" dirty="0"/>
+          </a:p>
+        </p:txBody>
+      </p:sp>
+      <p:sp>
+        <p:nvSpPr>
+          <p:cNvPr id="11" name="TextBox 10">
+            <a:extLst>
+              <a:ext uri="{FF2B5EF4-FFF2-40B4-BE49-F238E27FC236}">
+                <a16:creationId xmlns:a16="http://schemas.microsoft.com/office/drawing/2014/main" id="{B2458C86-456F-2D93-CC7F-96AC6F1884C2}"/>
+              </a:ext>
+            </a:extLst>
+          </p:cNvPr>
+          <p:cNvSpPr txBox="1"/>
+          <p:nvPr/>
+        </p:nvSpPr>
+        <p:spPr>
+          <a:xfrm>
+            <a:off x="-198478" y="687213"/>
+            <a:ext cx="1761459" cy="369332"/>
+          </a:xfrm>
+          <a:prstGeom prst="rect">
+            <a:avLst/>
+          </a:prstGeom>
+          <a:noFill/>
+        </p:spPr>
+        <p:txBody>
+          <a:bodyPr wrap="square" rtlCol="0">
+            <a:spAutoFit/>
+          </a:bodyPr>
+          <a:lstStyle/>
+          <a:p>
+            <a:pPr algn="r"/>
+            <a:r>
+              <a:rPr lang="en-US" dirty="0"/>
+              <a:t>+100ft</a:t>
+            </a:r>
+          </a:p>
+        </p:txBody>
+      </p:sp>
+      <p:sp>
+        <p:nvSpPr>
+          <p:cNvPr id="14" name="TextBox 13">
+            <a:extLst>
+              <a:ext uri="{FF2B5EF4-FFF2-40B4-BE49-F238E27FC236}">
+                <a16:creationId xmlns:a16="http://schemas.microsoft.com/office/drawing/2014/main" id="{E3041F6B-46E0-3B0F-9016-3ABEED65756C}"/>
+              </a:ext>
+            </a:extLst>
+          </p:cNvPr>
+          <p:cNvSpPr txBox="1"/>
+          <p:nvPr/>
+        </p:nvSpPr>
+        <p:spPr>
+          <a:xfrm>
+            <a:off x="331596" y="1609775"/>
+            <a:ext cx="1231385" cy="369332"/>
+          </a:xfrm>
+          <a:prstGeom prst="rect">
+            <a:avLst/>
+          </a:prstGeom>
+          <a:noFill/>
+        </p:spPr>
+        <p:txBody>
+          <a:bodyPr wrap="square" rtlCol="0">
+            <a:spAutoFit/>
+          </a:bodyPr>
+          <a:lstStyle/>
+          <a:p>
+            <a:pPr algn="r"/>
+            <a:r>
+              <a:rPr lang="en-US" dirty="0"/>
+              <a:t>+50ft</a:t>
+            </a:r>
+          </a:p>
+        </p:txBody>
+      </p:sp>
+      <p:sp>
+        <p:nvSpPr>
+          <p:cNvPr id="15" name="TextBox 14">
+            <a:extLst>
+              <a:ext uri="{FF2B5EF4-FFF2-40B4-BE49-F238E27FC236}">
+                <a16:creationId xmlns:a16="http://schemas.microsoft.com/office/drawing/2014/main" id="{FEC2C8A6-187D-6BFC-6C27-F73D07C24142}"/>
+              </a:ext>
+            </a:extLst>
+          </p:cNvPr>
+          <p:cNvSpPr txBox="1"/>
+          <p:nvPr/>
+        </p:nvSpPr>
+        <p:spPr>
+          <a:xfrm>
+            <a:off x="-198478" y="3429000"/>
+            <a:ext cx="1761457" cy="369332"/>
+          </a:xfrm>
+          <a:prstGeom prst="rect">
+            <a:avLst/>
+          </a:prstGeom>
+          <a:noFill/>
+        </p:spPr>
+        <p:txBody>
+          <a:bodyPr wrap="square" rtlCol="0">
+            <a:spAutoFit/>
+          </a:bodyPr>
+          <a:lstStyle/>
+          <a:p>
+            <a:pPr algn="r"/>
+            <a:r>
+              <a:rPr lang="en-US" dirty="0"/>
+              <a:t>-50ft</a:t>
+            </a:r>
+          </a:p>
+        </p:txBody>
+      </p:sp>
+      <p:sp>
+        <p:nvSpPr>
+          <p:cNvPr id="16" name="TextBox 15">
+            <a:extLst>
+              <a:ext uri="{FF2B5EF4-FFF2-40B4-BE49-F238E27FC236}">
+                <a16:creationId xmlns:a16="http://schemas.microsoft.com/office/drawing/2014/main" id="{21E18F4D-697A-44B4-C945-C47D4831FE91}"/>
+              </a:ext>
+            </a:extLst>
+          </p:cNvPr>
+          <p:cNvSpPr txBox="1"/>
+          <p:nvPr/>
+        </p:nvSpPr>
+        <p:spPr>
+          <a:xfrm>
+            <a:off x="-236578" y="4337167"/>
+            <a:ext cx="1761460" cy="369332"/>
+          </a:xfrm>
+          <a:prstGeom prst="rect">
+            <a:avLst/>
+          </a:prstGeom>
+          <a:noFill/>
+        </p:spPr>
+        <p:txBody>
+          <a:bodyPr wrap="square" rtlCol="0">
+            <a:spAutoFit/>
+          </a:bodyPr>
+          <a:lstStyle/>
+          <a:p>
+            <a:pPr algn="r"/>
+            <a:r>
+              <a:rPr lang="en-US" dirty="0"/>
+              <a:t>-100ft</a:t>
+            </a:r>
+          </a:p>
+        </p:txBody>
+      </p:sp>
+      <p:sp>
+        <p:nvSpPr>
+          <p:cNvPr id="24" name="Rectangle 23">
+            <a:extLst>
+              <a:ext uri="{FF2B5EF4-FFF2-40B4-BE49-F238E27FC236}">
+                <a16:creationId xmlns:a16="http://schemas.microsoft.com/office/drawing/2014/main" id="{A32E2AE0-B4BC-C713-0571-8C8046384B8D}"/>
+              </a:ext>
+            </a:extLst>
+          </p:cNvPr>
+          <p:cNvSpPr/>
+          <p:nvPr/>
+        </p:nvSpPr>
+        <p:spPr>
+          <a:xfrm>
+            <a:off x="7728101" y="861243"/>
+            <a:ext cx="3253564" cy="457200"/>
+          </a:xfrm>
+          <a:prstGeom prst="rect">
+            <a:avLst/>
+          </a:prstGeom>
+          <a:solidFill>
+            <a:srgbClr val="FF0000"/>
+          </a:solidFill>
+          <a:ln>
+            <a:noFill/>
+          </a:ln>
+        </p:spPr>
+        <p:style>
+          <a:lnRef idx="2">
+            <a:schemeClr val="accent1">
+              <a:shade val="15000"/>
+            </a:schemeClr>
+          </a:lnRef>
+          <a:fillRef idx="1">
+            <a:schemeClr val="accent1"/>
+          </a:fillRef>
+          <a:effectRef idx="0">
+            <a:schemeClr val="accent1"/>
+          </a:effectRef>
+          <a:fontRef idx="minor">
+            <a:schemeClr val="lt1"/>
+          </a:fontRef>
+        </p:style>
+        <p:txBody>
+          <a:bodyPr rtlCol="0" anchor="ctr"/>
+          <a:lstStyle/>
+          <a:p>
+            <a:pPr algn="ctr"/>
+            <a:endParaRPr lang="en-US"/>
+          </a:p>
+        </p:txBody>
+      </p:sp>
+      <p:sp>
+        <p:nvSpPr>
+          <p:cNvPr id="25" name="TextBox 24">
+            <a:extLst>
+              <a:ext uri="{FF2B5EF4-FFF2-40B4-BE49-F238E27FC236}">
+                <a16:creationId xmlns:a16="http://schemas.microsoft.com/office/drawing/2014/main" id="{155029F2-0121-32F4-FEFA-B769DC80F380}"/>
+              </a:ext>
+            </a:extLst>
+          </p:cNvPr>
+          <p:cNvSpPr txBox="1"/>
+          <p:nvPr/>
+        </p:nvSpPr>
+        <p:spPr>
+          <a:xfrm>
+            <a:off x="5966641" y="676577"/>
+            <a:ext cx="1761459" cy="369332"/>
+          </a:xfrm>
+          <a:prstGeom prst="rect">
+            <a:avLst/>
+          </a:prstGeom>
+          <a:noFill/>
+        </p:spPr>
+        <p:txBody>
+          <a:bodyPr wrap="square" rtlCol="0">
+            <a:spAutoFit/>
+          </a:bodyPr>
+          <a:lstStyle/>
+          <a:p>
+            <a:pPr algn="r"/>
+            <a:r>
+              <a:rPr lang="en-US" dirty="0"/>
+              <a:t>+100ft</a:t>
+            </a:r>
+          </a:p>
+        </p:txBody>
+      </p:sp>
+      <p:sp>
+        <p:nvSpPr>
+          <p:cNvPr id="27" name="TextBox 26">
+            <a:extLst>
+              <a:ext uri="{FF2B5EF4-FFF2-40B4-BE49-F238E27FC236}">
+                <a16:creationId xmlns:a16="http://schemas.microsoft.com/office/drawing/2014/main" id="{723D20C3-B059-AAB8-2E85-8C65478AEA5F}"/>
+              </a:ext>
+            </a:extLst>
+          </p:cNvPr>
+          <p:cNvSpPr txBox="1"/>
+          <p:nvPr/>
+        </p:nvSpPr>
+        <p:spPr>
+          <a:xfrm>
+            <a:off x="5966639" y="2467257"/>
+            <a:ext cx="1761460" cy="461665"/>
+          </a:xfrm>
+          <a:prstGeom prst="rect">
+            <a:avLst/>
+          </a:prstGeom>
+          <a:noFill/>
+        </p:spPr>
+        <p:txBody>
+          <a:bodyPr wrap="square" rtlCol="0">
+            <a:spAutoFit/>
+          </a:bodyPr>
+          <a:lstStyle/>
+          <a:p>
+            <a:pPr algn="r"/>
+            <a:r>
+              <a:rPr lang="en-US" sz="2400" b="1" dirty="0"/>
+              <a:t>Minimums</a:t>
+            </a:r>
+            <a:endParaRPr lang="en-US" b="1" dirty="0"/>
+          </a:p>
+        </p:txBody>
+      </p:sp>
+      <p:sp>
+        <p:nvSpPr>
+          <p:cNvPr id="2" name="Rectangle 1">
+            <a:extLst>
+              <a:ext uri="{FF2B5EF4-FFF2-40B4-BE49-F238E27FC236}">
+                <a16:creationId xmlns:a16="http://schemas.microsoft.com/office/drawing/2014/main" id="{467BE6DB-FAF9-722A-36A5-456ECF7C34DC}"/>
+              </a:ext>
+            </a:extLst>
+          </p:cNvPr>
+          <p:cNvSpPr/>
+          <p:nvPr/>
+        </p:nvSpPr>
+        <p:spPr>
+          <a:xfrm>
+            <a:off x="1563624" y="2697480"/>
+            <a:ext cx="3253565" cy="914400"/>
+          </a:xfrm>
+          <a:prstGeom prst="rect">
+            <a:avLst/>
+          </a:prstGeom>
+          <a:solidFill>
+            <a:srgbClr val="FFFA57"/>
+          </a:solidFill>
+          <a:ln>
+            <a:noFill/>
+          </a:ln>
+        </p:spPr>
+        <p:style>
+          <a:lnRef idx="2">
+            <a:schemeClr val="accent1">
+              <a:shade val="15000"/>
+            </a:schemeClr>
+          </a:lnRef>
+          <a:fillRef idx="1">
+            <a:schemeClr val="accent1"/>
+          </a:fillRef>
+          <a:effectRef idx="0">
+            <a:schemeClr val="accent1"/>
+          </a:effectRef>
+          <a:fontRef idx="minor">
+            <a:schemeClr val="lt1"/>
+          </a:fontRef>
+        </p:style>
+        <p:txBody>
+          <a:bodyPr rtlCol="0" anchor="ctr"/>
+          <a:lstStyle/>
+          <a:p>
+            <a:pPr algn="ctr"/>
+            <a:endParaRPr lang="en-US"/>
+          </a:p>
+        </p:txBody>
+      </p:sp>
+      <p:sp>
+        <p:nvSpPr>
+          <p:cNvPr id="4" name="Rectangle 3">
+            <a:extLst>
+              <a:ext uri="{FF2B5EF4-FFF2-40B4-BE49-F238E27FC236}">
+                <a16:creationId xmlns:a16="http://schemas.microsoft.com/office/drawing/2014/main" id="{CC161D42-F98B-878A-4341-EF7C1E429B78}"/>
+              </a:ext>
+            </a:extLst>
+          </p:cNvPr>
+          <p:cNvSpPr/>
+          <p:nvPr/>
+        </p:nvSpPr>
+        <p:spPr>
+          <a:xfrm>
+            <a:off x="1562980" y="3607433"/>
+            <a:ext cx="3253564" cy="914400"/>
+          </a:xfrm>
+          <a:prstGeom prst="rect">
+            <a:avLst/>
+          </a:prstGeom>
+          <a:solidFill>
+            <a:srgbClr val="FF0000"/>
+          </a:solidFill>
+          <a:ln>
+            <a:noFill/>
+          </a:ln>
+        </p:spPr>
+        <p:style>
+          <a:lnRef idx="2">
+            <a:schemeClr val="accent1">
+              <a:shade val="15000"/>
+            </a:schemeClr>
+          </a:lnRef>
+          <a:fillRef idx="1">
+            <a:schemeClr val="accent1"/>
+          </a:fillRef>
+          <a:effectRef idx="0">
+            <a:schemeClr val="accent1"/>
+          </a:effectRef>
+          <a:fontRef idx="minor">
+            <a:schemeClr val="lt1"/>
+          </a:fontRef>
+        </p:style>
+        <p:txBody>
+          <a:bodyPr rtlCol="0" anchor="ctr"/>
+          <a:lstStyle/>
+          <a:p>
+            <a:pPr algn="ctr"/>
+            <a:endParaRPr lang="en-US"/>
+          </a:p>
+        </p:txBody>
+      </p:sp>
+      <p:sp>
+        <p:nvSpPr>
+          <p:cNvPr id="12" name="TextBox 11">
+            <a:extLst>
+              <a:ext uri="{FF2B5EF4-FFF2-40B4-BE49-F238E27FC236}">
+                <a16:creationId xmlns:a16="http://schemas.microsoft.com/office/drawing/2014/main" id="{C11A62FE-B716-F383-3E6B-8B3B407FD53C}"/>
+              </a:ext>
+            </a:extLst>
+          </p:cNvPr>
+          <p:cNvSpPr txBox="1"/>
+          <p:nvPr/>
+        </p:nvSpPr>
+        <p:spPr>
+          <a:xfrm>
+            <a:off x="622997" y="2055266"/>
+            <a:ext cx="939979" cy="369332"/>
+          </a:xfrm>
+          <a:prstGeom prst="rect">
+            <a:avLst/>
+          </a:prstGeom>
+          <a:noFill/>
+        </p:spPr>
+        <p:txBody>
+          <a:bodyPr wrap="square" rtlCol="0">
+            <a:spAutoFit/>
+          </a:bodyPr>
+          <a:lstStyle/>
+          <a:p>
+            <a:pPr algn="r"/>
+            <a:r>
+              <a:rPr lang="en-US" dirty="0"/>
+              <a:t>+25ft</a:t>
+            </a:r>
+          </a:p>
+        </p:txBody>
+      </p:sp>
+      <p:cxnSp>
+        <p:nvCxnSpPr>
+          <p:cNvPr id="13" name="Straight Connector 12">
+            <a:extLst>
+              <a:ext uri="{FF2B5EF4-FFF2-40B4-BE49-F238E27FC236}">
+                <a16:creationId xmlns:a16="http://schemas.microsoft.com/office/drawing/2014/main" id="{123DF99C-1658-4802-6092-5966EA86EE15}"/>
+              </a:ext>
+            </a:extLst>
+          </p:cNvPr>
+          <p:cNvCxnSpPr>
+            <a:cxnSpLocks/>
+          </p:cNvCxnSpPr>
+          <p:nvPr/>
+        </p:nvCxnSpPr>
+        <p:spPr>
+          <a:xfrm>
+            <a:off x="1565074" y="2706576"/>
+            <a:ext cx="3251470" cy="0"/>
+          </a:xfrm>
+          <a:prstGeom prst="line">
+            <a:avLst/>
+          </a:prstGeom>
+          <a:ln w="76200">
+            <a:prstDash val="dash"/>
+          </a:ln>
+        </p:spPr>
+        <p:style>
+          <a:lnRef idx="1">
+            <a:schemeClr val="accent6"/>
+          </a:lnRef>
+          <a:fillRef idx="0">
+            <a:schemeClr val="accent6"/>
+          </a:fillRef>
+          <a:effectRef idx="0">
+            <a:schemeClr val="accent6"/>
+          </a:effectRef>
+          <a:fontRef idx="minor">
+            <a:schemeClr val="tx1"/>
+          </a:fontRef>
+        </p:style>
+      </p:cxnSp>
+      <p:sp>
+        <p:nvSpPr>
+          <p:cNvPr id="18" name="TextBox 17">
+            <a:extLst>
+              <a:ext uri="{FF2B5EF4-FFF2-40B4-BE49-F238E27FC236}">
+                <a16:creationId xmlns:a16="http://schemas.microsoft.com/office/drawing/2014/main" id="{8FBA1F3B-00E0-0305-C558-47D1C0A3484B}"/>
+              </a:ext>
+            </a:extLst>
+          </p:cNvPr>
+          <p:cNvSpPr txBox="1"/>
+          <p:nvPr/>
+        </p:nvSpPr>
+        <p:spPr>
+          <a:xfrm>
+            <a:off x="517944" y="2962570"/>
+            <a:ext cx="1045032" cy="369332"/>
+          </a:xfrm>
+          <a:prstGeom prst="rect">
+            <a:avLst/>
+          </a:prstGeom>
+          <a:noFill/>
+        </p:spPr>
+        <p:txBody>
+          <a:bodyPr wrap="square" rtlCol="0">
+            <a:spAutoFit/>
+          </a:bodyPr>
+          <a:lstStyle/>
+          <a:p>
+            <a:pPr algn="r"/>
+            <a:r>
+              <a:rPr lang="en-US" dirty="0"/>
+              <a:t>-25ft</a:t>
+            </a:r>
+          </a:p>
+        </p:txBody>
+      </p:sp>
+      <p:sp>
+        <p:nvSpPr>
+          <p:cNvPr id="21" name="TextBox 20">
+            <a:extLst>
+              <a:ext uri="{FF2B5EF4-FFF2-40B4-BE49-F238E27FC236}">
+                <a16:creationId xmlns:a16="http://schemas.microsoft.com/office/drawing/2014/main" id="{8236973E-AC08-4CD2-88C4-F857C0910F80}"/>
+              </a:ext>
+            </a:extLst>
+          </p:cNvPr>
+          <p:cNvSpPr txBox="1"/>
+          <p:nvPr/>
+        </p:nvSpPr>
+        <p:spPr>
+          <a:xfrm>
+            <a:off x="6893169" y="1609775"/>
+            <a:ext cx="834926" cy="369332"/>
+          </a:xfrm>
+          <a:prstGeom prst="rect">
+            <a:avLst/>
+          </a:prstGeom>
+          <a:noFill/>
+        </p:spPr>
+        <p:txBody>
+          <a:bodyPr wrap="square" rtlCol="0">
+            <a:spAutoFit/>
+          </a:bodyPr>
+          <a:lstStyle/>
+          <a:p>
+            <a:pPr algn="r"/>
+            <a:r>
+              <a:rPr lang="en-US" dirty="0"/>
+              <a:t>+50ft</a:t>
+            </a:r>
+          </a:p>
+        </p:txBody>
+      </p:sp>
+      <p:sp>
+        <p:nvSpPr>
+          <p:cNvPr id="22" name="TextBox 21">
+            <a:extLst>
+              <a:ext uri="{FF2B5EF4-FFF2-40B4-BE49-F238E27FC236}">
+                <a16:creationId xmlns:a16="http://schemas.microsoft.com/office/drawing/2014/main" id="{DCBC4840-B5F3-497B-0B91-1EE4313B2BE8}"/>
+              </a:ext>
+            </a:extLst>
+          </p:cNvPr>
+          <p:cNvSpPr txBox="1"/>
+          <p:nvPr/>
+        </p:nvSpPr>
+        <p:spPr>
+          <a:xfrm>
+            <a:off x="6788115" y="2055266"/>
+            <a:ext cx="939980" cy="369332"/>
+          </a:xfrm>
+          <a:prstGeom prst="rect">
+            <a:avLst/>
+          </a:prstGeom>
+          <a:noFill/>
+        </p:spPr>
+        <p:txBody>
+          <a:bodyPr wrap="square" rtlCol="0">
+            <a:spAutoFit/>
+          </a:bodyPr>
+          <a:lstStyle/>
+          <a:p>
+            <a:pPr algn="r"/>
+            <a:r>
+              <a:rPr lang="en-US" dirty="0"/>
+              <a:t>+25ft</a:t>
+            </a:r>
+          </a:p>
+        </p:txBody>
+      </p:sp>
+      <p:sp>
+        <p:nvSpPr>
+          <p:cNvPr id="23" name="TextBox 22">
+            <a:extLst>
+              <a:ext uri="{FF2B5EF4-FFF2-40B4-BE49-F238E27FC236}">
+                <a16:creationId xmlns:a16="http://schemas.microsoft.com/office/drawing/2014/main" id="{D28753D5-388E-E3C6-E6A5-CB649A36196C}"/>
+              </a:ext>
+            </a:extLst>
+          </p:cNvPr>
+          <p:cNvSpPr txBox="1"/>
+          <p:nvPr/>
+        </p:nvSpPr>
+        <p:spPr>
+          <a:xfrm>
+            <a:off x="6790402" y="1145462"/>
+            <a:ext cx="939980" cy="369332"/>
+          </a:xfrm>
+          <a:prstGeom prst="rect">
+            <a:avLst/>
+          </a:prstGeom>
+          <a:noFill/>
+        </p:spPr>
+        <p:txBody>
+          <a:bodyPr wrap="square" rtlCol="0">
+            <a:spAutoFit/>
+          </a:bodyPr>
+          <a:lstStyle/>
+          <a:p>
+            <a:pPr algn="r"/>
+            <a:r>
+              <a:rPr lang="en-US" dirty="0"/>
+              <a:t>+75ft</a:t>
+            </a:r>
+          </a:p>
+        </p:txBody>
+      </p:sp>
+      <p:sp>
+        <p:nvSpPr>
+          <p:cNvPr id="26" name="Rectangle 25">
+            <a:extLst>
+              <a:ext uri="{FF2B5EF4-FFF2-40B4-BE49-F238E27FC236}">
+                <a16:creationId xmlns:a16="http://schemas.microsoft.com/office/drawing/2014/main" id="{620E96B9-64ED-9AEF-E1F9-6481B2782C8D}"/>
+              </a:ext>
+            </a:extLst>
+          </p:cNvPr>
+          <p:cNvSpPr/>
+          <p:nvPr/>
+        </p:nvSpPr>
+        <p:spPr>
+          <a:xfrm>
+            <a:off x="7728095" y="1317522"/>
+            <a:ext cx="3253565" cy="457200"/>
+          </a:xfrm>
+          <a:prstGeom prst="rect">
+            <a:avLst/>
+          </a:prstGeom>
+          <a:solidFill>
+            <a:srgbClr val="FFFA57"/>
+          </a:solidFill>
+          <a:ln>
+            <a:noFill/>
+          </a:ln>
+        </p:spPr>
+        <p:style>
+          <a:lnRef idx="2">
+            <a:schemeClr val="accent1">
+              <a:shade val="15000"/>
+            </a:schemeClr>
+          </a:lnRef>
+          <a:fillRef idx="1">
+            <a:schemeClr val="accent1"/>
+          </a:fillRef>
+          <a:effectRef idx="0">
+            <a:schemeClr val="accent1"/>
+          </a:effectRef>
+          <a:fontRef idx="minor">
+            <a:schemeClr val="lt1"/>
+          </a:fontRef>
+        </p:style>
+        <p:txBody>
+          <a:bodyPr rtlCol="0" anchor="ctr"/>
+          <a:lstStyle/>
+          <a:p>
+            <a:pPr algn="ctr"/>
+            <a:endParaRPr lang="en-US"/>
+          </a:p>
+        </p:txBody>
+      </p:sp>
+      <p:sp>
+        <p:nvSpPr>
+          <p:cNvPr id="28" name="Rectangle 27">
+            <a:extLst>
+              <a:ext uri="{FF2B5EF4-FFF2-40B4-BE49-F238E27FC236}">
+                <a16:creationId xmlns:a16="http://schemas.microsoft.com/office/drawing/2014/main" id="{822DC3E6-0F91-7D69-B8EB-B42CB664245D}"/>
+              </a:ext>
+            </a:extLst>
+          </p:cNvPr>
+          <p:cNvSpPr/>
+          <p:nvPr/>
+        </p:nvSpPr>
+        <p:spPr>
+          <a:xfrm>
+            <a:off x="7728096" y="2238657"/>
+            <a:ext cx="3253564" cy="457200"/>
+          </a:xfrm>
+          <a:prstGeom prst="rect">
+            <a:avLst/>
+          </a:prstGeom>
+          <a:solidFill>
+            <a:srgbClr val="FF0000"/>
+          </a:solidFill>
+          <a:ln>
+            <a:noFill/>
+          </a:ln>
+        </p:spPr>
+        <p:style>
+          <a:lnRef idx="2">
+            <a:schemeClr val="accent1">
+              <a:shade val="15000"/>
+            </a:schemeClr>
+          </a:lnRef>
+          <a:fillRef idx="1">
+            <a:schemeClr val="accent1"/>
+          </a:fillRef>
+          <a:effectRef idx="0">
+            <a:schemeClr val="accent1"/>
+          </a:effectRef>
+          <a:fontRef idx="minor">
+            <a:schemeClr val="lt1"/>
+          </a:fontRef>
+        </p:style>
+        <p:txBody>
+          <a:bodyPr rtlCol="0" anchor="ctr"/>
+          <a:lstStyle/>
+          <a:p>
+            <a:pPr algn="ctr"/>
+            <a:endParaRPr lang="en-US"/>
+          </a:p>
+        </p:txBody>
+      </p:sp>
+      <p:cxnSp>
+        <p:nvCxnSpPr>
+          <p:cNvPr id="32" name="Straight Connector 31">
+            <a:extLst>
+              <a:ext uri="{FF2B5EF4-FFF2-40B4-BE49-F238E27FC236}">
+                <a16:creationId xmlns:a16="http://schemas.microsoft.com/office/drawing/2014/main" id="{019095E0-5EA8-14CC-F84B-9DA7740D68BA}"/>
+              </a:ext>
+            </a:extLst>
+          </p:cNvPr>
+          <p:cNvCxnSpPr>
+            <a:cxnSpLocks/>
+          </p:cNvCxnSpPr>
+          <p:nvPr/>
+        </p:nvCxnSpPr>
+        <p:spPr>
+          <a:xfrm>
+            <a:off x="7728095" y="1774345"/>
+            <a:ext cx="3253565" cy="0"/>
+          </a:xfrm>
+          <a:prstGeom prst="line">
+            <a:avLst/>
+          </a:prstGeom>
+          <a:ln w="76200">
+            <a:prstDash val="dash"/>
+          </a:ln>
+        </p:spPr>
+        <p:style>
+          <a:lnRef idx="1">
+            <a:schemeClr val="accent6"/>
+          </a:lnRef>
+          <a:fillRef idx="0">
+            <a:schemeClr val="accent6"/>
+          </a:fillRef>
+          <a:effectRef idx="0">
+            <a:schemeClr val="accent6"/>
+          </a:effectRef>
+          <a:fontRef idx="minor">
+            <a:schemeClr val="tx1"/>
+          </a:fontRef>
+        </p:style>
+      </p:cxnSp>
+    </p:spTree>
+    <p:extLst>
+      <p:ext uri="{BB962C8B-B14F-4D97-AF65-F5344CB8AC3E}">
+        <p14:creationId xmlns:p14="http://schemas.microsoft.com/office/powerpoint/2010/main" val="1619714635"/>
+      </p:ext>
+    </p:extLst>
+  </p:cSld>
+  <p:clrMapOvr>
+    <a:masterClrMapping/>
+  </p:clrMapOvr>
+</p:sld>
+</file>
+
 <file path=ppt/theme/theme1.xml><?xml version="1.0" encoding="utf-8"?>
 <a:theme xmlns:a="http://schemas.openxmlformats.org/drawingml/2006/main" name="Office Theme">
   <a:themeElements>

</xml_diff>

<commit_message>
Refreshed lost comms and flight categories
</commit_message>
<xml_diff>
--- a/docs/Tiles.pptx
+++ b/docs/Tiles.pptx
@@ -4,14 +4,18 @@
   <p:sldMasterIdLst>
     <p:sldMasterId id="2147483648" r:id="rId1"/>
   </p:sldMasterIdLst>
+  <p:notesMasterIdLst>
+    <p:notesMasterId r:id="rId10"/>
+  </p:notesMasterIdLst>
   <p:sldIdLst>
     <p:sldId id="256" r:id="rId2"/>
     <p:sldId id="257" r:id="rId3"/>
     <p:sldId id="260" r:id="rId4"/>
-    <p:sldId id="258" r:id="rId5"/>
-    <p:sldId id="261" r:id="rId6"/>
-    <p:sldId id="259" r:id="rId7"/>
-    <p:sldId id="263" r:id="rId8"/>
+    <p:sldId id="264" r:id="rId5"/>
+    <p:sldId id="258" r:id="rId6"/>
+    <p:sldId id="261" r:id="rId7"/>
+    <p:sldId id="259" r:id="rId8"/>
+    <p:sldId id="263" r:id="rId9"/>
   </p:sldIdLst>
   <p:sldSz cx="12192000" cy="6858000"/>
   <p:notesSz cx="6858000" cy="9144000"/>
@@ -129,6 +133,439 @@
 </p:presentation>
 </file>
 
+<file path=ppt/notesMasters/notesMaster1.xml><?xml version="1.0" encoding="utf-8"?>
+<p:notesMaster xmlns:a="http://schemas.openxmlformats.org/drawingml/2006/main" xmlns:r="http://schemas.openxmlformats.org/officeDocument/2006/relationships" xmlns:p="http://schemas.openxmlformats.org/presentationml/2006/main">
+  <p:cSld>
+    <p:bg>
+      <p:bgRef idx="1001">
+        <a:schemeClr val="bg1"/>
+      </p:bgRef>
+    </p:bg>
+    <p:spTree>
+      <p:nvGrpSpPr>
+        <p:cNvPr id="1" name=""/>
+        <p:cNvGrpSpPr/>
+        <p:nvPr/>
+      </p:nvGrpSpPr>
+      <p:grpSpPr>
+        <a:xfrm>
+          <a:off x="0" y="0"/>
+          <a:ext cx="0" cy="0"/>
+          <a:chOff x="0" y="0"/>
+          <a:chExt cx="0" cy="0"/>
+        </a:xfrm>
+      </p:grpSpPr>
+      <p:sp>
+        <p:nvSpPr>
+          <p:cNvPr id="2" name="Header Placeholder 1"/>
+          <p:cNvSpPr>
+            <a:spLocks noGrp="1"/>
+          </p:cNvSpPr>
+          <p:nvPr>
+            <p:ph type="hdr" sz="quarter"/>
+          </p:nvPr>
+        </p:nvSpPr>
+        <p:spPr>
+          <a:xfrm>
+            <a:off x="0" y="0"/>
+            <a:ext cx="2971800" cy="458788"/>
+          </a:xfrm>
+          <a:prstGeom prst="rect">
+            <a:avLst/>
+          </a:prstGeom>
+        </p:spPr>
+        <p:txBody>
+          <a:bodyPr vert="horz" lIns="91440" tIns="45720" rIns="91440" bIns="45720" rtlCol="0"/>
+          <a:lstStyle>
+            <a:lvl1pPr algn="l">
+              <a:defRPr sz="1200"/>
+            </a:lvl1pPr>
+          </a:lstStyle>
+          <a:p>
+            <a:endParaRPr lang="en-US"/>
+          </a:p>
+        </p:txBody>
+      </p:sp>
+      <p:sp>
+        <p:nvSpPr>
+          <p:cNvPr id="3" name="Date Placeholder 2"/>
+          <p:cNvSpPr>
+            <a:spLocks noGrp="1"/>
+          </p:cNvSpPr>
+          <p:nvPr>
+            <p:ph type="dt" idx="1"/>
+          </p:nvPr>
+        </p:nvSpPr>
+        <p:spPr>
+          <a:xfrm>
+            <a:off x="3884613" y="0"/>
+            <a:ext cx="2971800" cy="458788"/>
+          </a:xfrm>
+          <a:prstGeom prst="rect">
+            <a:avLst/>
+          </a:prstGeom>
+        </p:spPr>
+        <p:txBody>
+          <a:bodyPr vert="horz" lIns="91440" tIns="45720" rIns="91440" bIns="45720" rtlCol="0"/>
+          <a:lstStyle>
+            <a:lvl1pPr algn="r">
+              <a:defRPr sz="1200"/>
+            </a:lvl1pPr>
+          </a:lstStyle>
+          <a:p>
+            <a:fld id="{33ED5609-1730-904A-B815-DF633E0B1232}" type="datetimeFigureOut">
+              <a:rPr lang="en-US" smtClean="0"/>
+              <a:t>12/3/25</a:t>
+            </a:fld>
+            <a:endParaRPr lang="en-US"/>
+          </a:p>
+        </p:txBody>
+      </p:sp>
+      <p:sp>
+        <p:nvSpPr>
+          <p:cNvPr id="4" name="Slide Image Placeholder 3"/>
+          <p:cNvSpPr>
+            <a:spLocks noGrp="1" noRot="1" noChangeAspect="1"/>
+          </p:cNvSpPr>
+          <p:nvPr>
+            <p:ph type="sldImg" idx="2"/>
+          </p:nvPr>
+        </p:nvSpPr>
+        <p:spPr>
+          <a:xfrm>
+            <a:off x="685800" y="1143000"/>
+            <a:ext cx="5486400" cy="3086100"/>
+          </a:xfrm>
+          <a:prstGeom prst="rect">
+            <a:avLst/>
+          </a:prstGeom>
+          <a:noFill/>
+          <a:ln w="12700">
+            <a:solidFill>
+              <a:prstClr val="black"/>
+            </a:solidFill>
+          </a:ln>
+        </p:spPr>
+        <p:txBody>
+          <a:bodyPr vert="horz" lIns="91440" tIns="45720" rIns="91440" bIns="45720" rtlCol="0" anchor="ctr"/>
+          <a:lstStyle/>
+          <a:p>
+            <a:endParaRPr lang="en-US"/>
+          </a:p>
+        </p:txBody>
+      </p:sp>
+      <p:sp>
+        <p:nvSpPr>
+          <p:cNvPr id="5" name="Notes Placeholder 4"/>
+          <p:cNvSpPr>
+            <a:spLocks noGrp="1"/>
+          </p:cNvSpPr>
+          <p:nvPr>
+            <p:ph type="body" sz="quarter" idx="3"/>
+          </p:nvPr>
+        </p:nvSpPr>
+        <p:spPr>
+          <a:xfrm>
+            <a:off x="685800" y="4400550"/>
+            <a:ext cx="5486400" cy="3600450"/>
+          </a:xfrm>
+          <a:prstGeom prst="rect">
+            <a:avLst/>
+          </a:prstGeom>
+        </p:spPr>
+        <p:txBody>
+          <a:bodyPr vert="horz" lIns="91440" tIns="45720" rIns="91440" bIns="45720" rtlCol="0"/>
+          <a:lstStyle/>
+          <a:p>
+            <a:pPr lvl="0"/>
+            <a:r>
+              <a:rPr lang="en-US"/>
+              <a:t>Click to edit Master text styles</a:t>
+            </a:r>
+          </a:p>
+          <a:p>
+            <a:pPr lvl="1"/>
+            <a:r>
+              <a:rPr lang="en-US"/>
+              <a:t>Second level</a:t>
+            </a:r>
+          </a:p>
+          <a:p>
+            <a:pPr lvl="2"/>
+            <a:r>
+              <a:rPr lang="en-US"/>
+              <a:t>Third level</a:t>
+            </a:r>
+          </a:p>
+          <a:p>
+            <a:pPr lvl="3"/>
+            <a:r>
+              <a:rPr lang="en-US"/>
+              <a:t>Fourth level</a:t>
+            </a:r>
+          </a:p>
+          <a:p>
+            <a:pPr lvl="4"/>
+            <a:r>
+              <a:rPr lang="en-US"/>
+              <a:t>Fifth level</a:t>
+            </a:r>
+          </a:p>
+        </p:txBody>
+      </p:sp>
+      <p:sp>
+        <p:nvSpPr>
+          <p:cNvPr id="6" name="Footer Placeholder 5"/>
+          <p:cNvSpPr>
+            <a:spLocks noGrp="1"/>
+          </p:cNvSpPr>
+          <p:nvPr>
+            <p:ph type="ftr" sz="quarter" idx="4"/>
+          </p:nvPr>
+        </p:nvSpPr>
+        <p:spPr>
+          <a:xfrm>
+            <a:off x="0" y="8685213"/>
+            <a:ext cx="2971800" cy="458787"/>
+          </a:xfrm>
+          <a:prstGeom prst="rect">
+            <a:avLst/>
+          </a:prstGeom>
+        </p:spPr>
+        <p:txBody>
+          <a:bodyPr vert="horz" lIns="91440" tIns="45720" rIns="91440" bIns="45720" rtlCol="0" anchor="b"/>
+          <a:lstStyle>
+            <a:lvl1pPr algn="l">
+              <a:defRPr sz="1200"/>
+            </a:lvl1pPr>
+          </a:lstStyle>
+          <a:p>
+            <a:endParaRPr lang="en-US"/>
+          </a:p>
+        </p:txBody>
+      </p:sp>
+      <p:sp>
+        <p:nvSpPr>
+          <p:cNvPr id="7" name="Slide Number Placeholder 6"/>
+          <p:cNvSpPr>
+            <a:spLocks noGrp="1"/>
+          </p:cNvSpPr>
+          <p:nvPr>
+            <p:ph type="sldNum" sz="quarter" idx="5"/>
+          </p:nvPr>
+        </p:nvSpPr>
+        <p:spPr>
+          <a:xfrm>
+            <a:off x="3884613" y="8685213"/>
+            <a:ext cx="2971800" cy="458787"/>
+          </a:xfrm>
+          <a:prstGeom prst="rect">
+            <a:avLst/>
+          </a:prstGeom>
+        </p:spPr>
+        <p:txBody>
+          <a:bodyPr vert="horz" lIns="91440" tIns="45720" rIns="91440" bIns="45720" rtlCol="0" anchor="b"/>
+          <a:lstStyle>
+            <a:lvl1pPr algn="r">
+              <a:defRPr sz="1200"/>
+            </a:lvl1pPr>
+          </a:lstStyle>
+          <a:p>
+            <a:fld id="{7B3432D0-B394-C346-AAC1-BB230118BB31}" type="slidenum">
+              <a:rPr lang="en-US" smtClean="0"/>
+              <a:t>‹#›</a:t>
+            </a:fld>
+            <a:endParaRPr lang="en-US"/>
+          </a:p>
+        </p:txBody>
+      </p:sp>
+    </p:spTree>
+    <p:extLst>
+      <p:ext uri="{BB962C8B-B14F-4D97-AF65-F5344CB8AC3E}">
+        <p14:creationId xmlns:p14="http://schemas.microsoft.com/office/powerpoint/2010/main" val="1439297601"/>
+      </p:ext>
+    </p:extLst>
+  </p:cSld>
+  <p:clrMap bg1="lt1" tx1="dk1" bg2="lt2" tx2="dk2" accent1="accent1" accent2="accent2" accent3="accent3" accent4="accent4" accent5="accent5" accent6="accent6" hlink="hlink" folHlink="folHlink"/>
+  <p:notesStyle>
+    <a:lvl1pPr marL="0" algn="l" defTabSz="914400" rtl="0" eaLnBrk="1" latinLnBrk="0" hangingPunct="1">
+      <a:defRPr sz="1200" kern="1200">
+        <a:solidFill>
+          <a:schemeClr val="tx1"/>
+        </a:solidFill>
+        <a:latin typeface="+mn-lt"/>
+        <a:ea typeface="+mn-ea"/>
+        <a:cs typeface="+mn-cs"/>
+      </a:defRPr>
+    </a:lvl1pPr>
+    <a:lvl2pPr marL="457200" algn="l" defTabSz="914400" rtl="0" eaLnBrk="1" latinLnBrk="0" hangingPunct="1">
+      <a:defRPr sz="1200" kern="1200">
+        <a:solidFill>
+          <a:schemeClr val="tx1"/>
+        </a:solidFill>
+        <a:latin typeface="+mn-lt"/>
+        <a:ea typeface="+mn-ea"/>
+        <a:cs typeface="+mn-cs"/>
+      </a:defRPr>
+    </a:lvl2pPr>
+    <a:lvl3pPr marL="914400" algn="l" defTabSz="914400" rtl="0" eaLnBrk="1" latinLnBrk="0" hangingPunct="1">
+      <a:defRPr sz="1200" kern="1200">
+        <a:solidFill>
+          <a:schemeClr val="tx1"/>
+        </a:solidFill>
+        <a:latin typeface="+mn-lt"/>
+        <a:ea typeface="+mn-ea"/>
+        <a:cs typeface="+mn-cs"/>
+      </a:defRPr>
+    </a:lvl3pPr>
+    <a:lvl4pPr marL="1371600" algn="l" defTabSz="914400" rtl="0" eaLnBrk="1" latinLnBrk="0" hangingPunct="1">
+      <a:defRPr sz="1200" kern="1200">
+        <a:solidFill>
+          <a:schemeClr val="tx1"/>
+        </a:solidFill>
+        <a:latin typeface="+mn-lt"/>
+        <a:ea typeface="+mn-ea"/>
+        <a:cs typeface="+mn-cs"/>
+      </a:defRPr>
+    </a:lvl4pPr>
+    <a:lvl5pPr marL="1828800" algn="l" defTabSz="914400" rtl="0" eaLnBrk="1" latinLnBrk="0" hangingPunct="1">
+      <a:defRPr sz="1200" kern="1200">
+        <a:solidFill>
+          <a:schemeClr val="tx1"/>
+        </a:solidFill>
+        <a:latin typeface="+mn-lt"/>
+        <a:ea typeface="+mn-ea"/>
+        <a:cs typeface="+mn-cs"/>
+      </a:defRPr>
+    </a:lvl5pPr>
+    <a:lvl6pPr marL="2286000" algn="l" defTabSz="914400" rtl="0" eaLnBrk="1" latinLnBrk="0" hangingPunct="1">
+      <a:defRPr sz="1200" kern="1200">
+        <a:solidFill>
+          <a:schemeClr val="tx1"/>
+        </a:solidFill>
+        <a:latin typeface="+mn-lt"/>
+        <a:ea typeface="+mn-ea"/>
+        <a:cs typeface="+mn-cs"/>
+      </a:defRPr>
+    </a:lvl6pPr>
+    <a:lvl7pPr marL="2743200" algn="l" defTabSz="914400" rtl="0" eaLnBrk="1" latinLnBrk="0" hangingPunct="1">
+      <a:defRPr sz="1200" kern="1200">
+        <a:solidFill>
+          <a:schemeClr val="tx1"/>
+        </a:solidFill>
+        <a:latin typeface="+mn-lt"/>
+        <a:ea typeface="+mn-ea"/>
+        <a:cs typeface="+mn-cs"/>
+      </a:defRPr>
+    </a:lvl7pPr>
+    <a:lvl8pPr marL="3200400" algn="l" defTabSz="914400" rtl="0" eaLnBrk="1" latinLnBrk="0" hangingPunct="1">
+      <a:defRPr sz="1200" kern="1200">
+        <a:solidFill>
+          <a:schemeClr val="tx1"/>
+        </a:solidFill>
+        <a:latin typeface="+mn-lt"/>
+        <a:ea typeface="+mn-ea"/>
+        <a:cs typeface="+mn-cs"/>
+      </a:defRPr>
+    </a:lvl8pPr>
+    <a:lvl9pPr marL="3657600" algn="l" defTabSz="914400" rtl="0" eaLnBrk="1" latinLnBrk="0" hangingPunct="1">
+      <a:defRPr sz="1200" kern="1200">
+        <a:solidFill>
+          <a:schemeClr val="tx1"/>
+        </a:solidFill>
+        <a:latin typeface="+mn-lt"/>
+        <a:ea typeface="+mn-ea"/>
+        <a:cs typeface="+mn-cs"/>
+      </a:defRPr>
+    </a:lvl9pPr>
+  </p:notesStyle>
+</p:notesMaster>
+</file>
+
+<file path=ppt/notesSlides/notesSlide1.xml><?xml version="1.0" encoding="utf-8"?>
+<p:notes xmlns:a="http://schemas.openxmlformats.org/drawingml/2006/main" xmlns:r="http://schemas.openxmlformats.org/officeDocument/2006/relationships" xmlns:p="http://schemas.openxmlformats.org/presentationml/2006/main">
+  <p:cSld>
+    <p:spTree>
+      <p:nvGrpSpPr>
+        <p:cNvPr id="1" name=""/>
+        <p:cNvGrpSpPr/>
+        <p:nvPr/>
+      </p:nvGrpSpPr>
+      <p:grpSpPr>
+        <a:xfrm>
+          <a:off x="0" y="0"/>
+          <a:ext cx="0" cy="0"/>
+          <a:chOff x="0" y="0"/>
+          <a:chExt cx="0" cy="0"/>
+        </a:xfrm>
+      </p:grpSpPr>
+      <p:sp>
+        <p:nvSpPr>
+          <p:cNvPr id="2" name="Slide Image Placeholder 1"/>
+          <p:cNvSpPr>
+            <a:spLocks noGrp="1" noRot="1" noChangeAspect="1"/>
+          </p:cNvSpPr>
+          <p:nvPr>
+            <p:ph type="sldImg"/>
+          </p:nvPr>
+        </p:nvSpPr>
+        <p:spPr/>
+      </p:sp>
+      <p:sp>
+        <p:nvSpPr>
+          <p:cNvPr id="3" name="Notes Placeholder 2"/>
+          <p:cNvSpPr>
+            <a:spLocks noGrp="1"/>
+          </p:cNvSpPr>
+          <p:nvPr>
+            <p:ph type="body" idx="1"/>
+          </p:nvPr>
+        </p:nvSpPr>
+        <p:spPr/>
+        <p:txBody>
+          <a:bodyPr/>
+          <a:lstStyle/>
+          <a:p>
+            <a:endParaRPr lang="en-US" dirty="0"/>
+          </a:p>
+        </p:txBody>
+      </p:sp>
+      <p:sp>
+        <p:nvSpPr>
+          <p:cNvPr id="4" name="Slide Number Placeholder 3"/>
+          <p:cNvSpPr>
+            <a:spLocks noGrp="1"/>
+          </p:cNvSpPr>
+          <p:nvPr>
+            <p:ph type="sldNum" sz="quarter" idx="5"/>
+          </p:nvPr>
+        </p:nvSpPr>
+        <p:spPr/>
+        <p:txBody>
+          <a:bodyPr/>
+          <a:lstStyle/>
+          <a:p>
+            <a:fld id="{7B3432D0-B394-C346-AAC1-BB230118BB31}" type="slidenum">
+              <a:rPr lang="en-US" smtClean="0"/>
+              <a:t>4</a:t>
+            </a:fld>
+            <a:endParaRPr lang="en-US"/>
+          </a:p>
+        </p:txBody>
+      </p:sp>
+    </p:spTree>
+    <p:extLst>
+      <p:ext uri="{BB962C8B-B14F-4D97-AF65-F5344CB8AC3E}">
+        <p14:creationId xmlns:p14="http://schemas.microsoft.com/office/powerpoint/2010/main" val="1164252305"/>
+      </p:ext>
+    </p:extLst>
+  </p:cSld>
+  <p:clrMapOvr>
+    <a:masterClrMapping/>
+  </p:clrMapOvr>
+</p:notes>
+</file>
+
 <file path=ppt/slideLayouts/slideLayout1.xml><?xml version="1.0" encoding="utf-8"?>
 <p:sldLayout xmlns:a="http://schemas.openxmlformats.org/drawingml/2006/main" xmlns:r="http://schemas.openxmlformats.org/officeDocument/2006/relationships" xmlns:p="http://schemas.openxmlformats.org/presentationml/2006/main" type="title" preserve="1">
   <p:cSld name="Title Slide">
@@ -276,7 +713,7 @@
           <a:p>
             <a:fld id="{46DA5C4A-B072-FB48-84F0-865EE8F0D843}" type="datetimeFigureOut">
               <a:rPr lang="en-US" smtClean="0"/>
-              <a:t>11/20/25</a:t>
+              <a:t>12/3/25</a:t>
             </a:fld>
             <a:endParaRPr lang="en-US"/>
           </a:p>
@@ -474,7 +911,7 @@
           <a:p>
             <a:fld id="{46DA5C4A-B072-FB48-84F0-865EE8F0D843}" type="datetimeFigureOut">
               <a:rPr lang="en-US" smtClean="0"/>
-              <a:t>11/20/25</a:t>
+              <a:t>12/3/25</a:t>
             </a:fld>
             <a:endParaRPr lang="en-US"/>
           </a:p>
@@ -682,7 +1119,7 @@
           <a:p>
             <a:fld id="{46DA5C4A-B072-FB48-84F0-865EE8F0D843}" type="datetimeFigureOut">
               <a:rPr lang="en-US" smtClean="0"/>
-              <a:t>11/20/25</a:t>
+              <a:t>12/3/25</a:t>
             </a:fld>
             <a:endParaRPr lang="en-US"/>
           </a:p>
@@ -880,7 +1317,7 @@
           <a:p>
             <a:fld id="{46DA5C4A-B072-FB48-84F0-865EE8F0D843}" type="datetimeFigureOut">
               <a:rPr lang="en-US" smtClean="0"/>
-              <a:t>11/20/25</a:t>
+              <a:t>12/3/25</a:t>
             </a:fld>
             <a:endParaRPr lang="en-US"/>
           </a:p>
@@ -1155,7 +1592,7 @@
           <a:p>
             <a:fld id="{46DA5C4A-B072-FB48-84F0-865EE8F0D843}" type="datetimeFigureOut">
               <a:rPr lang="en-US" smtClean="0"/>
-              <a:t>11/20/25</a:t>
+              <a:t>12/3/25</a:t>
             </a:fld>
             <a:endParaRPr lang="en-US"/>
           </a:p>
@@ -1420,7 +1857,7 @@
           <a:p>
             <a:fld id="{46DA5C4A-B072-FB48-84F0-865EE8F0D843}" type="datetimeFigureOut">
               <a:rPr lang="en-US" smtClean="0"/>
-              <a:t>11/20/25</a:t>
+              <a:t>12/3/25</a:t>
             </a:fld>
             <a:endParaRPr lang="en-US"/>
           </a:p>
@@ -1832,7 +2269,7 @@
           <a:p>
             <a:fld id="{46DA5C4A-B072-FB48-84F0-865EE8F0D843}" type="datetimeFigureOut">
               <a:rPr lang="en-US" smtClean="0"/>
-              <a:t>11/20/25</a:t>
+              <a:t>12/3/25</a:t>
             </a:fld>
             <a:endParaRPr lang="en-US"/>
           </a:p>
@@ -1973,7 +2410,7 @@
           <a:p>
             <a:fld id="{46DA5C4A-B072-FB48-84F0-865EE8F0D843}" type="datetimeFigureOut">
               <a:rPr lang="en-US" smtClean="0"/>
-              <a:t>11/20/25</a:t>
+              <a:t>12/3/25</a:t>
             </a:fld>
             <a:endParaRPr lang="en-US"/>
           </a:p>
@@ -2086,7 +2523,7 @@
           <a:p>
             <a:fld id="{46DA5C4A-B072-FB48-84F0-865EE8F0D843}" type="datetimeFigureOut">
               <a:rPr lang="en-US" smtClean="0"/>
-              <a:t>11/20/25</a:t>
+              <a:t>12/3/25</a:t>
             </a:fld>
             <a:endParaRPr lang="en-US"/>
           </a:p>
@@ -2397,7 +2834,7 @@
           <a:p>
             <a:fld id="{46DA5C4A-B072-FB48-84F0-865EE8F0D843}" type="datetimeFigureOut">
               <a:rPr lang="en-US" smtClean="0"/>
-              <a:t>11/20/25</a:t>
+              <a:t>12/3/25</a:t>
             </a:fld>
             <a:endParaRPr lang="en-US"/>
           </a:p>
@@ -2685,7 +3122,7 @@
           <a:p>
             <a:fld id="{46DA5C4A-B072-FB48-84F0-865EE8F0D843}" type="datetimeFigureOut">
               <a:rPr lang="en-US" smtClean="0"/>
-              <a:t>11/20/25</a:t>
+              <a:t>12/3/25</a:t>
             </a:fld>
             <a:endParaRPr lang="en-US"/>
           </a:p>
@@ -2926,7 +3363,7 @@
           <a:p>
             <a:fld id="{46DA5C4A-B072-FB48-84F0-865EE8F0D843}" type="datetimeFigureOut">
               <a:rPr lang="en-US" smtClean="0"/>
-              <a:t>11/20/25</a:t>
+              <a:t>12/3/25</a:t>
             </a:fld>
             <a:endParaRPr lang="en-US"/>
           </a:p>
@@ -4449,7 +4886,7 @@
         <p:spPr>
           <a:xfrm>
             <a:off x="3561905" y="3335675"/>
-            <a:ext cx="4380603" cy="369332"/>
+            <a:ext cx="1636625" cy="369332"/>
           </a:xfrm>
           <a:prstGeom prst="rect">
             <a:avLst/>
@@ -4468,8 +4905,13 @@
             </a:r>
             <a:r>
               <a:rPr lang="en-US" dirty="0"/>
-              <a:t>: Assign’d &gt; Vectors &gt; Expct’d &gt; Filed</a:t>
-            </a:r>
+              <a:t>: </a:t>
+            </a:r>
+            <a:r>
+              <a:rPr lang="en-US" b="1" dirty="0"/>
+              <a:t>A.V.E.F</a:t>
+            </a:r>
+            <a:endParaRPr lang="en-US" dirty="0"/>
           </a:p>
         </p:txBody>
       </p:sp>
@@ -4507,7 +4949,7 @@
             </a:r>
             <a:r>
               <a:rPr lang="en-US" dirty="0"/>
-              <a:t>: Max( Min, Expct’d, Assign’d)</a:t>
+              <a:t>: Max( MEA, Expected, Assigned)</a:t>
             </a:r>
           </a:p>
         </p:txBody>
@@ -4901,6 +5343,48 @@
             <a:r>
               <a:rPr lang="en-US" dirty="0"/>
               <a:t>Proceed To Fix</a:t>
+            </a:r>
+          </a:p>
+        </p:txBody>
+      </p:sp>
+      <p:sp>
+        <p:nvSpPr>
+          <p:cNvPr id="9" name="TextBox 8">
+            <a:extLst>
+              <a:ext uri="{FF2B5EF4-FFF2-40B4-BE49-F238E27FC236}">
+                <a16:creationId xmlns:a16="http://schemas.microsoft.com/office/drawing/2014/main" id="{24770D74-0530-7A05-5244-670C08A7B339}"/>
+              </a:ext>
+            </a:extLst>
+          </p:cNvPr>
+          <p:cNvSpPr txBox="1"/>
+          <p:nvPr/>
+        </p:nvSpPr>
+        <p:spPr>
+          <a:xfrm>
+            <a:off x="5321345" y="3058676"/>
+            <a:ext cx="2505577" cy="646331"/>
+          </a:xfrm>
+          <a:prstGeom prst="rect">
+            <a:avLst/>
+          </a:prstGeom>
+          <a:noFill/>
+        </p:spPr>
+        <p:txBody>
+          <a:bodyPr wrap="square" rtlCol="0">
+            <a:spAutoFit/>
+          </a:bodyPr>
+          <a:lstStyle/>
+          <a:p>
+            <a:r>
+              <a:rPr lang="en-US" dirty="0">
+                <a:solidFill>
+                  <a:schemeClr val="tx1">
+                    <a:lumMod val="50000"/>
+                    <a:lumOff val="50000"/>
+                  </a:schemeClr>
+                </a:solidFill>
+              </a:rPr>
+              <a:t>Assigned &gt; Vectors &gt; Expected &gt; Filed</a:t>
             </a:r>
           </a:p>
         </p:txBody>
@@ -6069,6 +6553,523 @@
   <p:cSld>
     <p:spTree>
       <p:nvGrpSpPr>
+        <p:cNvPr id="1" name="">
+          <a:extLst>
+            <a:ext uri="{FF2B5EF4-FFF2-40B4-BE49-F238E27FC236}">
+              <a16:creationId xmlns:a16="http://schemas.microsoft.com/office/drawing/2014/main" id="{FBCA4B10-A949-F9C9-82C0-DD66B82FE064}"/>
+            </a:ext>
+          </a:extLst>
+        </p:cNvPr>
+        <p:cNvGrpSpPr/>
+        <p:nvPr/>
+      </p:nvGrpSpPr>
+      <p:grpSpPr>
+        <a:xfrm>
+          <a:off x="0" y="0"/>
+          <a:ext cx="0" cy="0"/>
+          <a:chOff x="0" y="0"/>
+          <a:chExt cx="0" cy="0"/>
+        </a:xfrm>
+      </p:grpSpPr>
+      <p:sp>
+        <p:nvSpPr>
+          <p:cNvPr id="12" name="Rectangle 11">
+            <a:extLst>
+              <a:ext uri="{FF2B5EF4-FFF2-40B4-BE49-F238E27FC236}">
+                <a16:creationId xmlns:a16="http://schemas.microsoft.com/office/drawing/2014/main" id="{C08C154A-315C-2B8C-228D-993F3016EBA3}"/>
+              </a:ext>
+            </a:extLst>
+          </p:cNvPr>
+          <p:cNvSpPr/>
+          <p:nvPr/>
+        </p:nvSpPr>
+        <p:spPr>
+          <a:xfrm>
+            <a:off x="3546554" y="2645848"/>
+            <a:ext cx="3291840" cy="3291840"/>
+          </a:xfrm>
+          <a:prstGeom prst="rect">
+            <a:avLst/>
+          </a:prstGeom>
+          <a:noFill/>
+          <a:ln w="38100">
+            <a:solidFill>
+              <a:schemeClr val="tx2">
+                <a:lumMod val="90000"/>
+                <a:lumOff val="10000"/>
+              </a:schemeClr>
+            </a:solidFill>
+          </a:ln>
+        </p:spPr>
+        <p:style>
+          <a:lnRef idx="2">
+            <a:schemeClr val="accent1">
+              <a:shade val="15000"/>
+            </a:schemeClr>
+          </a:lnRef>
+          <a:fillRef idx="1">
+            <a:schemeClr val="accent1"/>
+          </a:fillRef>
+          <a:effectRef idx="0">
+            <a:schemeClr val="accent1"/>
+          </a:effectRef>
+          <a:fontRef idx="minor">
+            <a:schemeClr val="lt1"/>
+          </a:fontRef>
+        </p:style>
+        <p:txBody>
+          <a:bodyPr rtlCol="0" anchor="t"/>
+          <a:lstStyle/>
+          <a:p>
+            <a:pPr algn="r"/>
+            <a:r>
+              <a:rPr lang="en-US" sz="3200" b="1" dirty="0">
+                <a:solidFill>
+                  <a:schemeClr val="tx2">
+                    <a:lumMod val="90000"/>
+                    <a:lumOff val="10000"/>
+                  </a:schemeClr>
+                </a:solidFill>
+              </a:rPr>
+              <a:t>MVFR</a:t>
+            </a:r>
+            <a:endParaRPr lang="en-US" sz="2800" b="1" dirty="0">
+              <a:solidFill>
+                <a:schemeClr val="tx2">
+                  <a:lumMod val="90000"/>
+                  <a:lumOff val="10000"/>
+                </a:schemeClr>
+              </a:solidFill>
+            </a:endParaRPr>
+          </a:p>
+        </p:txBody>
+      </p:sp>
+      <p:sp>
+        <p:nvSpPr>
+          <p:cNvPr id="2" name="Rectangle 1">
+            <a:extLst>
+              <a:ext uri="{FF2B5EF4-FFF2-40B4-BE49-F238E27FC236}">
+                <a16:creationId xmlns:a16="http://schemas.microsoft.com/office/drawing/2014/main" id="{A307277C-10B1-2411-220E-DF1479CA07B3}"/>
+              </a:ext>
+            </a:extLst>
+          </p:cNvPr>
+          <p:cNvSpPr/>
+          <p:nvPr/>
+        </p:nvSpPr>
+        <p:spPr>
+          <a:xfrm>
+            <a:off x="3561907" y="1541721"/>
+            <a:ext cx="4380614" cy="4380614"/>
+          </a:xfrm>
+          <a:prstGeom prst="rect">
+            <a:avLst/>
+          </a:prstGeom>
+          <a:noFill/>
+        </p:spPr>
+        <p:style>
+          <a:lnRef idx="2">
+            <a:schemeClr val="accent1">
+              <a:shade val="15000"/>
+            </a:schemeClr>
+          </a:lnRef>
+          <a:fillRef idx="1">
+            <a:schemeClr val="accent1"/>
+          </a:fillRef>
+          <a:effectRef idx="0">
+            <a:schemeClr val="accent1"/>
+          </a:effectRef>
+          <a:fontRef idx="minor">
+            <a:schemeClr val="lt1"/>
+          </a:fontRef>
+        </p:style>
+        <p:txBody>
+          <a:bodyPr rtlCol="0" anchor="t"/>
+          <a:lstStyle/>
+          <a:p>
+            <a:pPr algn="r"/>
+            <a:r>
+              <a:rPr lang="en-US" sz="3600" b="1" dirty="0">
+                <a:solidFill>
+                  <a:schemeClr val="tx1"/>
+                </a:solidFill>
+              </a:rPr>
+              <a:t>VFR</a:t>
+            </a:r>
+          </a:p>
+        </p:txBody>
+      </p:sp>
+      <p:sp>
+        <p:nvSpPr>
+          <p:cNvPr id="6" name="Rectangle 5">
+            <a:extLst>
+              <a:ext uri="{FF2B5EF4-FFF2-40B4-BE49-F238E27FC236}">
+                <a16:creationId xmlns:a16="http://schemas.microsoft.com/office/drawing/2014/main" id="{3906A37E-76BB-7442-50CA-5D836BBDA070}"/>
+              </a:ext>
+            </a:extLst>
+          </p:cNvPr>
+          <p:cNvSpPr/>
+          <p:nvPr/>
+        </p:nvSpPr>
+        <p:spPr>
+          <a:xfrm>
+            <a:off x="3546554" y="3743128"/>
+            <a:ext cx="2194560" cy="2194560"/>
+          </a:xfrm>
+          <a:prstGeom prst="rect">
+            <a:avLst/>
+          </a:prstGeom>
+          <a:solidFill>
+            <a:srgbClr val="FF0000">
+              <a:alpha val="50196"/>
+            </a:srgbClr>
+          </a:solidFill>
+          <a:ln w="38100">
+            <a:solidFill>
+              <a:srgbClr val="C00000"/>
+            </a:solidFill>
+          </a:ln>
+        </p:spPr>
+        <p:style>
+          <a:lnRef idx="2">
+            <a:schemeClr val="accent1">
+              <a:shade val="15000"/>
+            </a:schemeClr>
+          </a:lnRef>
+          <a:fillRef idx="1">
+            <a:schemeClr val="accent1"/>
+          </a:fillRef>
+          <a:effectRef idx="0">
+            <a:schemeClr val="accent1"/>
+          </a:effectRef>
+          <a:fontRef idx="minor">
+            <a:schemeClr val="lt1"/>
+          </a:fontRef>
+        </p:style>
+        <p:txBody>
+          <a:bodyPr rtlCol="0" anchor="t"/>
+          <a:lstStyle/>
+          <a:p>
+            <a:pPr algn="r"/>
+            <a:r>
+              <a:rPr lang="en-US" sz="2800" b="1" dirty="0">
+                <a:solidFill>
+                  <a:schemeClr val="bg1"/>
+                </a:solidFill>
+              </a:rPr>
+              <a:t>IFR</a:t>
+            </a:r>
+          </a:p>
+        </p:txBody>
+      </p:sp>
+      <p:sp>
+        <p:nvSpPr>
+          <p:cNvPr id="7" name="TextBox 6">
+            <a:extLst>
+              <a:ext uri="{FF2B5EF4-FFF2-40B4-BE49-F238E27FC236}">
+                <a16:creationId xmlns:a16="http://schemas.microsoft.com/office/drawing/2014/main" id="{DA950C53-36F0-F581-2084-F3A7A89BC6CC}"/>
+              </a:ext>
+            </a:extLst>
+          </p:cNvPr>
+          <p:cNvSpPr txBox="1"/>
+          <p:nvPr/>
+        </p:nvSpPr>
+        <p:spPr>
+          <a:xfrm>
+            <a:off x="3561907" y="4363390"/>
+            <a:ext cx="1256044" cy="461665"/>
+          </a:xfrm>
+          <a:prstGeom prst="rect">
+            <a:avLst/>
+          </a:prstGeom>
+          <a:noFill/>
+        </p:spPr>
+        <p:txBody>
+          <a:bodyPr wrap="square" rtlCol="0">
+            <a:spAutoFit/>
+          </a:bodyPr>
+          <a:lstStyle/>
+          <a:p>
+            <a:r>
+              <a:rPr lang="en-US" sz="2400" b="1" dirty="0">
+                <a:solidFill>
+                  <a:schemeClr val="bg1"/>
+                </a:solidFill>
+              </a:rPr>
+              <a:t>500ft</a:t>
+            </a:r>
+          </a:p>
+        </p:txBody>
+      </p:sp>
+      <p:sp>
+        <p:nvSpPr>
+          <p:cNvPr id="8" name="TextBox 7">
+            <a:extLst>
+              <a:ext uri="{FF2B5EF4-FFF2-40B4-BE49-F238E27FC236}">
+                <a16:creationId xmlns:a16="http://schemas.microsoft.com/office/drawing/2014/main" id="{43B39A75-1C3E-1E40-90F3-9566EFC271D1}"/>
+              </a:ext>
+            </a:extLst>
+          </p:cNvPr>
+          <p:cNvSpPr txBox="1"/>
+          <p:nvPr/>
+        </p:nvSpPr>
+        <p:spPr>
+          <a:xfrm rot="5400000">
+            <a:off x="4269589" y="5085447"/>
+            <a:ext cx="1256044" cy="461665"/>
+          </a:xfrm>
+          <a:prstGeom prst="rect">
+            <a:avLst/>
+          </a:prstGeom>
+          <a:noFill/>
+        </p:spPr>
+        <p:txBody>
+          <a:bodyPr wrap="square" rtlCol="0">
+            <a:spAutoFit/>
+          </a:bodyPr>
+          <a:lstStyle/>
+          <a:p>
+            <a:pPr algn="r"/>
+            <a:r>
+              <a:rPr lang="en-US" sz="2400" b="1" dirty="0">
+                <a:solidFill>
+                  <a:schemeClr val="bg1"/>
+                </a:solidFill>
+              </a:rPr>
+              <a:t>1sm</a:t>
+            </a:r>
+          </a:p>
+        </p:txBody>
+      </p:sp>
+      <p:sp>
+        <p:nvSpPr>
+          <p:cNvPr id="5" name="Rectangle 4">
+            <a:extLst>
+              <a:ext uri="{FF2B5EF4-FFF2-40B4-BE49-F238E27FC236}">
+                <a16:creationId xmlns:a16="http://schemas.microsoft.com/office/drawing/2014/main" id="{FBEEFEB7-98D2-2940-14B3-CA2E504356A5}"/>
+              </a:ext>
+            </a:extLst>
+          </p:cNvPr>
+          <p:cNvSpPr/>
+          <p:nvPr/>
+        </p:nvSpPr>
+        <p:spPr>
+          <a:xfrm>
+            <a:off x="3546554" y="4840408"/>
+            <a:ext cx="1097280" cy="1097280"/>
+          </a:xfrm>
+          <a:prstGeom prst="rect">
+            <a:avLst/>
+          </a:prstGeom>
+          <a:solidFill>
+            <a:srgbClr val="FF52FF"/>
+          </a:solidFill>
+          <a:ln w="38100">
+            <a:solidFill>
+              <a:srgbClr val="7E287F"/>
+            </a:solidFill>
+          </a:ln>
+        </p:spPr>
+        <p:style>
+          <a:lnRef idx="2">
+            <a:schemeClr val="accent1">
+              <a:shade val="15000"/>
+            </a:schemeClr>
+          </a:lnRef>
+          <a:fillRef idx="1">
+            <a:schemeClr val="accent1"/>
+          </a:fillRef>
+          <a:effectRef idx="0">
+            <a:schemeClr val="accent1"/>
+          </a:effectRef>
+          <a:fontRef idx="minor">
+            <a:schemeClr val="lt1"/>
+          </a:fontRef>
+        </p:style>
+        <p:txBody>
+          <a:bodyPr rtlCol="0" anchor="ctr"/>
+          <a:lstStyle/>
+          <a:p>
+            <a:pPr algn="ctr"/>
+            <a:r>
+              <a:rPr lang="en-US" sz="2400" b="1" dirty="0"/>
+              <a:t>LIFR</a:t>
+            </a:r>
+            <a:endParaRPr lang="en-US" sz="2800" b="1" dirty="0"/>
+          </a:p>
+        </p:txBody>
+      </p:sp>
+      <p:sp>
+        <p:nvSpPr>
+          <p:cNvPr id="17" name="TextBox 16">
+            <a:extLst>
+              <a:ext uri="{FF2B5EF4-FFF2-40B4-BE49-F238E27FC236}">
+                <a16:creationId xmlns:a16="http://schemas.microsoft.com/office/drawing/2014/main" id="{126677B5-88D0-AAFB-5702-FAC4039CFA57}"/>
+              </a:ext>
+            </a:extLst>
+          </p:cNvPr>
+          <p:cNvSpPr txBox="1"/>
+          <p:nvPr/>
+        </p:nvSpPr>
+        <p:spPr>
+          <a:xfrm>
+            <a:off x="3561907" y="3266110"/>
+            <a:ext cx="1256044" cy="461665"/>
+          </a:xfrm>
+          <a:prstGeom prst="rect">
+            <a:avLst/>
+          </a:prstGeom>
+          <a:noFill/>
+        </p:spPr>
+        <p:txBody>
+          <a:bodyPr wrap="square" rtlCol="0">
+            <a:spAutoFit/>
+          </a:bodyPr>
+          <a:lstStyle/>
+          <a:p>
+            <a:r>
+              <a:rPr lang="en-US" sz="2400" b="1" dirty="0">
+                <a:solidFill>
+                  <a:schemeClr val="accent1">
+                    <a:lumMod val="75000"/>
+                  </a:schemeClr>
+                </a:solidFill>
+              </a:rPr>
+              <a:t>1,000ft</a:t>
+            </a:r>
+          </a:p>
+        </p:txBody>
+      </p:sp>
+      <p:sp>
+        <p:nvSpPr>
+          <p:cNvPr id="18" name="TextBox 17">
+            <a:extLst>
+              <a:ext uri="{FF2B5EF4-FFF2-40B4-BE49-F238E27FC236}">
+                <a16:creationId xmlns:a16="http://schemas.microsoft.com/office/drawing/2014/main" id="{1EADCDFE-2D0C-C107-1382-A7521DCF6184}"/>
+              </a:ext>
+            </a:extLst>
+          </p:cNvPr>
+          <p:cNvSpPr txBox="1"/>
+          <p:nvPr/>
+        </p:nvSpPr>
+        <p:spPr>
+          <a:xfrm>
+            <a:off x="3561907" y="2146863"/>
+            <a:ext cx="1256044" cy="461665"/>
+          </a:xfrm>
+          <a:prstGeom prst="rect">
+            <a:avLst/>
+          </a:prstGeom>
+          <a:noFill/>
+        </p:spPr>
+        <p:txBody>
+          <a:bodyPr wrap="square" rtlCol="0">
+            <a:spAutoFit/>
+          </a:bodyPr>
+          <a:lstStyle/>
+          <a:p>
+            <a:r>
+              <a:rPr lang="en-US" sz="2400" b="1" dirty="0"/>
+              <a:t>3,000ft</a:t>
+            </a:r>
+          </a:p>
+        </p:txBody>
+      </p:sp>
+      <p:sp>
+        <p:nvSpPr>
+          <p:cNvPr id="19" name="TextBox 18">
+            <a:extLst>
+              <a:ext uri="{FF2B5EF4-FFF2-40B4-BE49-F238E27FC236}">
+                <a16:creationId xmlns:a16="http://schemas.microsoft.com/office/drawing/2014/main" id="{8A648E87-1D4E-5906-0318-4C0B87954CC7}"/>
+              </a:ext>
+            </a:extLst>
+          </p:cNvPr>
+          <p:cNvSpPr txBox="1"/>
+          <p:nvPr/>
+        </p:nvSpPr>
+        <p:spPr>
+          <a:xfrm rot="5400000">
+            <a:off x="5366134" y="5085448"/>
+            <a:ext cx="1256044" cy="461665"/>
+          </a:xfrm>
+          <a:prstGeom prst="rect">
+            <a:avLst/>
+          </a:prstGeom>
+          <a:noFill/>
+        </p:spPr>
+        <p:txBody>
+          <a:bodyPr wrap="square" rtlCol="0">
+            <a:spAutoFit/>
+          </a:bodyPr>
+          <a:lstStyle/>
+          <a:p>
+            <a:pPr algn="r"/>
+            <a:r>
+              <a:rPr lang="en-US" sz="2400" b="1" dirty="0">
+                <a:solidFill>
+                  <a:schemeClr val="accent1">
+                    <a:lumMod val="50000"/>
+                  </a:schemeClr>
+                </a:solidFill>
+              </a:rPr>
+              <a:t>3sm</a:t>
+            </a:r>
+          </a:p>
+        </p:txBody>
+      </p:sp>
+      <p:sp>
+        <p:nvSpPr>
+          <p:cNvPr id="20" name="TextBox 19">
+            <a:extLst>
+              <a:ext uri="{FF2B5EF4-FFF2-40B4-BE49-F238E27FC236}">
+                <a16:creationId xmlns:a16="http://schemas.microsoft.com/office/drawing/2014/main" id="{69B6D325-585C-4675-A445-96D479FE1678}"/>
+              </a:ext>
+            </a:extLst>
+          </p:cNvPr>
+          <p:cNvSpPr txBox="1"/>
+          <p:nvPr/>
+        </p:nvSpPr>
+        <p:spPr>
+          <a:xfrm rot="5400000">
+            <a:off x="6462679" y="5085449"/>
+            <a:ext cx="1256044" cy="461665"/>
+          </a:xfrm>
+          <a:prstGeom prst="rect">
+            <a:avLst/>
+          </a:prstGeom>
+          <a:noFill/>
+        </p:spPr>
+        <p:txBody>
+          <a:bodyPr wrap="square" rtlCol="0">
+            <a:spAutoFit/>
+          </a:bodyPr>
+          <a:lstStyle/>
+          <a:p>
+            <a:pPr algn="r"/>
+            <a:r>
+              <a:rPr lang="en-US" sz="2400" b="1" dirty="0"/>
+              <a:t>5sm</a:t>
+            </a:r>
+          </a:p>
+        </p:txBody>
+      </p:sp>
+    </p:spTree>
+    <p:extLst>
+      <p:ext uri="{BB962C8B-B14F-4D97-AF65-F5344CB8AC3E}">
+        <p14:creationId xmlns:p14="http://schemas.microsoft.com/office/powerpoint/2010/main" val="2963174842"/>
+      </p:ext>
+    </p:extLst>
+  </p:cSld>
+  <p:clrMapOvr>
+    <a:masterClrMapping/>
+  </p:clrMapOvr>
+</p:sld>
+</file>
+
+<file path=ppt/slides/slide5.xml><?xml version="1.0" encoding="utf-8"?>
+<p:sld xmlns:a="http://schemas.openxmlformats.org/drawingml/2006/main" xmlns:r="http://schemas.openxmlformats.org/officeDocument/2006/relationships" xmlns:p="http://schemas.openxmlformats.org/presentationml/2006/main">
+  <p:cSld>
+    <p:spTree>
+      <p:nvGrpSpPr>
         <p:cNvPr id="1" name=""/>
         <p:cNvGrpSpPr/>
         <p:nvPr/>
@@ -6396,7 +7397,7 @@
 </p:sld>
 </file>
 
-<file path=ppt/slides/slide5.xml><?xml version="1.0" encoding="utf-8"?>
+<file path=ppt/slides/slide6.xml><?xml version="1.0" encoding="utf-8"?>
 <p:sld xmlns:a="http://schemas.openxmlformats.org/drawingml/2006/main" xmlns:r="http://schemas.openxmlformats.org/officeDocument/2006/relationships" xmlns:p="http://schemas.openxmlformats.org/presentationml/2006/main">
   <p:cSld>
     <p:spTree>
@@ -8431,7 +9432,7 @@
 </p:sld>
 </file>
 
-<file path=ppt/slides/slide6.xml><?xml version="1.0" encoding="utf-8"?>
+<file path=ppt/slides/slide7.xml><?xml version="1.0" encoding="utf-8"?>
 <p:sld xmlns:a="http://schemas.openxmlformats.org/drawingml/2006/main" xmlns:r="http://schemas.openxmlformats.org/officeDocument/2006/relationships" xmlns:p="http://schemas.openxmlformats.org/presentationml/2006/main">
   <p:cSld>
     <p:spTree>
@@ -9094,7 +10095,7 @@
 </p:sld>
 </file>
 
-<file path=ppt/slides/slide7.xml><?xml version="1.0" encoding="utf-8"?>
+<file path=ppt/slides/slide8.xml><?xml version="1.0" encoding="utf-8"?>
 <p:sld xmlns:a="http://schemas.openxmlformats.org/drawingml/2006/main" xmlns:r="http://schemas.openxmlformats.org/officeDocument/2006/relationships" xmlns:p="http://schemas.openxmlformats.org/presentationml/2006/main">
   <p:cSld>
     <p:spTree>
@@ -10369,4 +11370,319 @@
     </a:ext>
   </a:extLst>
 </a:theme>
+</file>
+
+<file path=ppt/theme/theme2.xml><?xml version="1.0" encoding="utf-8"?>
+<a:theme xmlns:a="http://schemas.openxmlformats.org/drawingml/2006/main" name="Office Theme">
+  <a:themeElements>
+    <a:clrScheme name="Office">
+      <a:dk1>
+        <a:sysClr val="windowText" lastClr="000000"/>
+      </a:dk1>
+      <a:lt1>
+        <a:sysClr val="window" lastClr="FFFFFF"/>
+      </a:lt1>
+      <a:dk2>
+        <a:srgbClr val="0E2841"/>
+      </a:dk2>
+      <a:lt2>
+        <a:srgbClr val="E8E8E8"/>
+      </a:lt2>
+      <a:accent1>
+        <a:srgbClr val="156082"/>
+      </a:accent1>
+      <a:accent2>
+        <a:srgbClr val="E97132"/>
+      </a:accent2>
+      <a:accent3>
+        <a:srgbClr val="196B24"/>
+      </a:accent3>
+      <a:accent4>
+        <a:srgbClr val="0F9ED5"/>
+      </a:accent4>
+      <a:accent5>
+        <a:srgbClr val="A02B93"/>
+      </a:accent5>
+      <a:accent6>
+        <a:srgbClr val="4EA72E"/>
+      </a:accent6>
+      <a:hlink>
+        <a:srgbClr val="467886"/>
+      </a:hlink>
+      <a:folHlink>
+        <a:srgbClr val="96607D"/>
+      </a:folHlink>
+    </a:clrScheme>
+    <a:fontScheme name="Office">
+      <a:majorFont>
+        <a:latin typeface="Aptos Display" panose="02110004020202020204"/>
+        <a:ea typeface=""/>
+        <a:cs typeface=""/>
+        <a:font script="Jpan" typeface="游ゴシック Light"/>
+        <a:font script="Hang" typeface="맑은 고딕"/>
+        <a:font script="Hans" typeface="等线 Light"/>
+        <a:font script="Hant" typeface="新細明體"/>
+        <a:font script="Arab" typeface="Times New Roman"/>
+        <a:font script="Hebr" typeface="Times New Roman"/>
+        <a:font script="Thai" typeface="Angsana New"/>
+        <a:font script="Ethi" typeface="Nyala"/>
+        <a:font script="Beng" typeface="Vrinda"/>
+        <a:font script="Gujr" typeface="Shruti"/>
+        <a:font script="Khmr" typeface="MoolBoran"/>
+        <a:font script="Knda" typeface="Tunga"/>
+        <a:font script="Guru" typeface="Raavi"/>
+        <a:font script="Cans" typeface="Euphemia"/>
+        <a:font script="Cher" typeface="Plantagenet Cherokee"/>
+        <a:font script="Yiii" typeface="Microsoft Yi Baiti"/>
+        <a:font script="Tibt" typeface="Microsoft Himalaya"/>
+        <a:font script="Thaa" typeface="MV Boli"/>
+        <a:font script="Deva" typeface="Mangal"/>
+        <a:font script="Telu" typeface="Gautami"/>
+        <a:font script="Taml" typeface="Latha"/>
+        <a:font script="Syrc" typeface="Estrangelo Edessa"/>
+        <a:font script="Orya" typeface="Kalinga"/>
+        <a:font script="Mlym" typeface="Kartika"/>
+        <a:font script="Laoo" typeface="DokChampa"/>
+        <a:font script="Sinh" typeface="Iskoola Pota"/>
+        <a:font script="Mong" typeface="Mongolian Baiti"/>
+        <a:font script="Viet" typeface="Times New Roman"/>
+        <a:font script="Uigh" typeface="Microsoft Uighur"/>
+        <a:font script="Geor" typeface="Sylfaen"/>
+        <a:font script="Armn" typeface="Arial"/>
+        <a:font script="Bugi" typeface="Leelawadee UI"/>
+        <a:font script="Bopo" typeface="Microsoft JhengHei"/>
+        <a:font script="Java" typeface="Javanese Text"/>
+        <a:font script="Lisu" typeface="Segoe UI"/>
+        <a:font script="Mymr" typeface="Myanmar Text"/>
+        <a:font script="Nkoo" typeface="Ebrima"/>
+        <a:font script="Olck" typeface="Nirmala UI"/>
+        <a:font script="Osma" typeface="Ebrima"/>
+        <a:font script="Phag" typeface="Phagspa"/>
+        <a:font script="Syrn" typeface="Estrangelo Edessa"/>
+        <a:font script="Syrj" typeface="Estrangelo Edessa"/>
+        <a:font script="Syre" typeface="Estrangelo Edessa"/>
+        <a:font script="Sora" typeface="Nirmala UI"/>
+        <a:font script="Tale" typeface="Microsoft Tai Le"/>
+        <a:font script="Talu" typeface="Microsoft New Tai Lue"/>
+        <a:font script="Tfng" typeface="Ebrima"/>
+      </a:majorFont>
+      <a:minorFont>
+        <a:latin typeface="Aptos" panose="02110004020202020204"/>
+        <a:ea typeface=""/>
+        <a:cs typeface=""/>
+        <a:font script="Jpan" typeface="游ゴシック"/>
+        <a:font script="Hang" typeface="맑은 고딕"/>
+        <a:font script="Hans" typeface="等线"/>
+        <a:font script="Hant" typeface="新細明體"/>
+        <a:font script="Arab" typeface="Arial"/>
+        <a:font script="Hebr" typeface="Arial"/>
+        <a:font script="Thai" typeface="Cordia New"/>
+        <a:font script="Ethi" typeface="Nyala"/>
+        <a:font script="Beng" typeface="Vrinda"/>
+        <a:font script="Gujr" typeface="Shruti"/>
+        <a:font script="Khmr" typeface="DaunPenh"/>
+        <a:font script="Knda" typeface="Tunga"/>
+        <a:font script="Guru" typeface="Raavi"/>
+        <a:font script="Cans" typeface="Euphemia"/>
+        <a:font script="Cher" typeface="Plantagenet Cherokee"/>
+        <a:font script="Yiii" typeface="Microsoft Yi Baiti"/>
+        <a:font script="Tibt" typeface="Microsoft Himalaya"/>
+        <a:font script="Thaa" typeface="MV Boli"/>
+        <a:font script="Deva" typeface="Mangal"/>
+        <a:font script="Telu" typeface="Gautami"/>
+        <a:font script="Taml" typeface="Latha"/>
+        <a:font script="Syrc" typeface="Estrangelo Edessa"/>
+        <a:font script="Orya" typeface="Kalinga"/>
+        <a:font script="Mlym" typeface="Kartika"/>
+        <a:font script="Laoo" typeface="DokChampa"/>
+        <a:font script="Sinh" typeface="Iskoola Pota"/>
+        <a:font script="Mong" typeface="Mongolian Baiti"/>
+        <a:font script="Viet" typeface="Arial"/>
+        <a:font script="Uigh" typeface="Microsoft Uighur"/>
+        <a:font script="Geor" typeface="Sylfaen"/>
+        <a:font script="Armn" typeface="Arial"/>
+        <a:font script="Bugi" typeface="Leelawadee UI"/>
+        <a:font script="Bopo" typeface="Microsoft JhengHei"/>
+        <a:font script="Java" typeface="Javanese Text"/>
+        <a:font script="Lisu" typeface="Segoe UI"/>
+        <a:font script="Mymr" typeface="Myanmar Text"/>
+        <a:font script="Nkoo" typeface="Ebrima"/>
+        <a:font script="Olck" typeface="Nirmala UI"/>
+        <a:font script="Osma" typeface="Ebrima"/>
+        <a:font script="Phag" typeface="Phagspa"/>
+        <a:font script="Syrn" typeface="Estrangelo Edessa"/>
+        <a:font script="Syrj" typeface="Estrangelo Edessa"/>
+        <a:font script="Syre" typeface="Estrangelo Edessa"/>
+        <a:font script="Sora" typeface="Nirmala UI"/>
+        <a:font script="Tale" typeface="Microsoft Tai Le"/>
+        <a:font script="Talu" typeface="Microsoft New Tai Lue"/>
+        <a:font script="Tfng" typeface="Ebrima"/>
+      </a:minorFont>
+    </a:fontScheme>
+    <a:fmtScheme name="Office">
+      <a:fillStyleLst>
+        <a:solidFill>
+          <a:schemeClr val="phClr"/>
+        </a:solidFill>
+        <a:gradFill rotWithShape="1">
+          <a:gsLst>
+            <a:gs pos="0">
+              <a:schemeClr val="phClr">
+                <a:lumMod val="110000"/>
+                <a:satMod val="105000"/>
+                <a:tint val="67000"/>
+              </a:schemeClr>
+            </a:gs>
+            <a:gs pos="50000">
+              <a:schemeClr val="phClr">
+                <a:lumMod val="105000"/>
+                <a:satMod val="103000"/>
+                <a:tint val="73000"/>
+              </a:schemeClr>
+            </a:gs>
+            <a:gs pos="100000">
+              <a:schemeClr val="phClr">
+                <a:lumMod val="105000"/>
+                <a:satMod val="109000"/>
+                <a:tint val="81000"/>
+              </a:schemeClr>
+            </a:gs>
+          </a:gsLst>
+          <a:lin ang="5400000" scaled="0"/>
+        </a:gradFill>
+        <a:gradFill rotWithShape="1">
+          <a:gsLst>
+            <a:gs pos="0">
+              <a:schemeClr val="phClr">
+                <a:satMod val="103000"/>
+                <a:lumMod val="102000"/>
+                <a:tint val="94000"/>
+              </a:schemeClr>
+            </a:gs>
+            <a:gs pos="50000">
+              <a:schemeClr val="phClr">
+                <a:satMod val="110000"/>
+                <a:lumMod val="100000"/>
+                <a:shade val="100000"/>
+              </a:schemeClr>
+            </a:gs>
+            <a:gs pos="100000">
+              <a:schemeClr val="phClr">
+                <a:lumMod val="99000"/>
+                <a:satMod val="120000"/>
+                <a:shade val="78000"/>
+              </a:schemeClr>
+            </a:gs>
+          </a:gsLst>
+          <a:lin ang="5400000" scaled="0"/>
+        </a:gradFill>
+      </a:fillStyleLst>
+      <a:lnStyleLst>
+        <a:ln w="12700" cap="flat" cmpd="sng" algn="ctr">
+          <a:solidFill>
+            <a:schemeClr val="phClr"/>
+          </a:solidFill>
+          <a:prstDash val="solid"/>
+          <a:miter lim="800000"/>
+        </a:ln>
+        <a:ln w="19050" cap="flat" cmpd="sng" algn="ctr">
+          <a:solidFill>
+            <a:schemeClr val="phClr"/>
+          </a:solidFill>
+          <a:prstDash val="solid"/>
+          <a:miter lim="800000"/>
+        </a:ln>
+        <a:ln w="25400" cap="flat" cmpd="sng" algn="ctr">
+          <a:solidFill>
+            <a:schemeClr val="phClr"/>
+          </a:solidFill>
+          <a:prstDash val="solid"/>
+          <a:miter lim="800000"/>
+        </a:ln>
+      </a:lnStyleLst>
+      <a:effectStyleLst>
+        <a:effectStyle>
+          <a:effectLst/>
+        </a:effectStyle>
+        <a:effectStyle>
+          <a:effectLst/>
+        </a:effectStyle>
+        <a:effectStyle>
+          <a:effectLst>
+            <a:outerShdw blurRad="57150" dist="19050" dir="5400000" algn="ctr" rotWithShape="0">
+              <a:srgbClr val="000000">
+                <a:alpha val="63000"/>
+              </a:srgbClr>
+            </a:outerShdw>
+          </a:effectLst>
+        </a:effectStyle>
+      </a:effectStyleLst>
+      <a:bgFillStyleLst>
+        <a:solidFill>
+          <a:schemeClr val="phClr"/>
+        </a:solidFill>
+        <a:solidFill>
+          <a:schemeClr val="phClr">
+            <a:tint val="95000"/>
+            <a:satMod val="170000"/>
+          </a:schemeClr>
+        </a:solidFill>
+        <a:gradFill rotWithShape="1">
+          <a:gsLst>
+            <a:gs pos="0">
+              <a:schemeClr val="phClr">
+                <a:tint val="93000"/>
+                <a:satMod val="150000"/>
+                <a:shade val="98000"/>
+                <a:lumMod val="102000"/>
+              </a:schemeClr>
+            </a:gs>
+            <a:gs pos="50000">
+              <a:schemeClr val="phClr">
+                <a:tint val="98000"/>
+                <a:satMod val="130000"/>
+                <a:shade val="90000"/>
+                <a:lumMod val="103000"/>
+              </a:schemeClr>
+            </a:gs>
+            <a:gs pos="100000">
+              <a:schemeClr val="phClr">
+                <a:shade val="63000"/>
+                <a:satMod val="120000"/>
+              </a:schemeClr>
+            </a:gs>
+          </a:gsLst>
+          <a:lin ang="5400000" scaled="0"/>
+        </a:gradFill>
+      </a:bgFillStyleLst>
+    </a:fmtScheme>
+  </a:themeElements>
+  <a:objectDefaults>
+    <a:lnDef>
+      <a:spPr/>
+      <a:bodyPr/>
+      <a:lstStyle/>
+      <a:style>
+        <a:lnRef idx="2">
+          <a:schemeClr val="accent1"/>
+        </a:lnRef>
+        <a:fillRef idx="0">
+          <a:schemeClr val="accent1"/>
+        </a:fillRef>
+        <a:effectRef idx="1">
+          <a:schemeClr val="accent1"/>
+        </a:effectRef>
+        <a:fontRef idx="minor">
+          <a:schemeClr val="tx1"/>
+        </a:fontRef>
+      </a:style>
+    </a:lnDef>
+  </a:objectDefaults>
+  <a:extraClrSchemeLst/>
+  <a:extLst>
+    <a:ext uri="{05A4C25C-085E-4340-85A3-A5531E510DB2}">
+      <thm15:themeFamily xmlns:thm15="http://schemas.microsoft.com/office/thememl/2012/main" name="Office Theme" id="{2E142A2C-CD16-42D6-873A-C26D2A0506FA}" vid="{1BDDFF52-6CD6-40A5-AB3C-68EB2F1E4D0A}"/>
+    </a:ext>
+  </a:extLst>
+</a:theme>
 </file>
</xml_diff>

<commit_message>
Updated IFR Lost comms
</commit_message>
<xml_diff>
--- a/docs/Tiles.pptx
+++ b/docs/Tiles.pptx
@@ -4590,7 +4590,7 @@
         </p:nvSpPr>
         <p:spPr>
           <a:xfrm>
-            <a:off x="3561906" y="1574905"/>
+            <a:off x="3500150" y="956909"/>
             <a:ext cx="4380613" cy="400110"/>
           </a:xfrm>
           <a:prstGeom prst="rect">
@@ -4612,51 +4612,6 @@
           </a:p>
         </p:txBody>
       </p:sp>
-      <p:cxnSp>
-        <p:nvCxnSpPr>
-          <p:cNvPr id="4" name="Straight Connector 3">
-            <a:extLst>
-              <a:ext uri="{FF2B5EF4-FFF2-40B4-BE49-F238E27FC236}">
-                <a16:creationId xmlns:a16="http://schemas.microsoft.com/office/drawing/2014/main" id="{82AD4D69-2C2D-CAF3-E130-F33BFA7A1E9A}"/>
-              </a:ext>
-            </a:extLst>
-          </p:cNvPr>
-          <p:cNvCxnSpPr>
-            <a:cxnSpLocks/>
-          </p:cNvCxnSpPr>
-          <p:nvPr/>
-        </p:nvCxnSpPr>
-        <p:spPr>
-          <a:xfrm>
-            <a:off x="2977116" y="2007900"/>
-            <a:ext cx="6049926" cy="0"/>
-          </a:xfrm>
-          <a:prstGeom prst="line">
-            <a:avLst/>
-          </a:prstGeom>
-          <a:ln>
-            <a:solidFill>
-              <a:schemeClr val="bg1">
-                <a:lumMod val="75000"/>
-              </a:schemeClr>
-            </a:solidFill>
-          </a:ln>
-        </p:spPr>
-        <p:style>
-          <a:lnRef idx="2">
-            <a:schemeClr val="accent1"/>
-          </a:lnRef>
-          <a:fillRef idx="0">
-            <a:schemeClr val="accent1"/>
-          </a:fillRef>
-          <a:effectRef idx="1">
-            <a:schemeClr val="accent1"/>
-          </a:effectRef>
-          <a:fontRef idx="minor">
-            <a:schemeClr val="tx1"/>
-          </a:fontRef>
-        </p:style>
-      </p:cxnSp>
       <p:sp>
         <p:nvSpPr>
           <p:cNvPr id="5" name="TextBox 4">
@@ -4671,7 +4626,7 @@
         </p:nvSpPr>
         <p:spPr>
           <a:xfrm>
-            <a:off x="3738880" y="2138390"/>
+            <a:off x="3738880" y="1774318"/>
             <a:ext cx="620562" cy="561692"/>
           </a:xfrm>
           <a:prstGeom prst="rect">
@@ -4719,7 +4674,7 @@
         </p:nvCxnSpPr>
         <p:spPr>
           <a:xfrm>
-            <a:off x="4359442" y="2419236"/>
+            <a:off x="4359442" y="2055164"/>
             <a:ext cx="998823" cy="5998"/>
           </a:xfrm>
           <a:prstGeom prst="straightConnector1">
@@ -4764,7 +4719,7 @@
         </p:nvCxnSpPr>
         <p:spPr>
           <a:xfrm>
-            <a:off x="4049161" y="2700082"/>
+            <a:off x="4049161" y="2336010"/>
             <a:ext cx="0" cy="574746"/>
           </a:xfrm>
           <a:prstGeom prst="straightConnector1">
@@ -4806,7 +4761,7 @@
         </p:nvSpPr>
         <p:spPr>
           <a:xfrm>
-            <a:off x="4359442" y="2152991"/>
+            <a:off x="4359442" y="1788919"/>
             <a:ext cx="274380" cy="261610"/>
           </a:xfrm>
           <a:prstGeom prst="rect">
@@ -4843,7 +4798,7 @@
         </p:nvSpPr>
         <p:spPr>
           <a:xfrm>
-            <a:off x="5358265" y="2102068"/>
+            <a:off x="5358265" y="1737996"/>
             <a:ext cx="2505577" cy="646331"/>
           </a:xfrm>
           <a:prstGeom prst="rect">
@@ -4885,7 +4840,7 @@
         </p:nvSpPr>
         <p:spPr>
           <a:xfrm>
-            <a:off x="3561905" y="3335675"/>
+            <a:off x="3561905" y="2971603"/>
             <a:ext cx="1636625" cy="369332"/>
           </a:xfrm>
           <a:prstGeom prst="rect">
@@ -4929,7 +4884,7 @@
         </p:nvSpPr>
         <p:spPr>
           <a:xfrm>
-            <a:off x="3561892" y="3706841"/>
+            <a:off x="3561892" y="3520571"/>
             <a:ext cx="4301938" cy="369332"/>
           </a:xfrm>
           <a:prstGeom prst="rect">
@@ -5007,7 +4962,7 @@
         </p:nvSpPr>
         <p:spPr>
           <a:xfrm>
-            <a:off x="4033373" y="2645636"/>
+            <a:off x="4033373" y="2281564"/>
             <a:ext cx="274380" cy="261610"/>
           </a:xfrm>
           <a:prstGeom prst="rect">
@@ -5361,7 +5316,7 @@
         </p:nvSpPr>
         <p:spPr>
           <a:xfrm>
-            <a:off x="5321345" y="3058676"/>
+            <a:off x="5321345" y="2838543"/>
             <a:ext cx="2505577" cy="646331"/>
           </a:xfrm>
           <a:prstGeom prst="rect">

</xml_diff>